<commit_message>
many changes i forget
</commit_message>
<xml_diff>
--- a/template/template.pptx
+++ b/template/template.pptx
@@ -12,10 +12,10 @@
   </p:handoutMasterIdLst>
   <p:sldIdLst>
     <p:sldId id="256" r:id="rId2"/>
-    <p:sldId id="257" r:id="rId3"/>
-    <p:sldId id="258" r:id="rId4"/>
+    <p:sldId id="259" r:id="rId3"/>
+    <p:sldId id="261" r:id="rId4"/>
   </p:sldIdLst>
-  <p:sldSz cx="9144000" cy="6858000" type="screen4x3"/>
+  <p:sldSz cx="12192000" cy="6858000"/>
   <p:notesSz cx="6858000" cy="9144000"/>
   <p:defaultTextStyle>
     <a:defPPr>
@@ -115,12 +115,12 @@
   <p:extLst>
     <p:ext uri="{EFAFB233-063F-42B5-8137-9DF3F51BA10A}">
       <p15:sldGuideLst xmlns:p15="http://schemas.microsoft.com/office/powerpoint/2012/main">
-        <p15:guide id="1" orient="horz" pos="2160">
+        <p15:guide id="1" orient="horz" pos="2160" userDrawn="1">
           <p15:clr>
             <a:srgbClr val="A4A3A4"/>
           </p15:clr>
         </p15:guide>
-        <p15:guide id="2" pos="2880">
+        <p15:guide id="2" pos="3840" userDrawn="1">
           <p15:clr>
             <a:srgbClr val="A4A3A4"/>
           </p15:clr>
@@ -234,7 +234,7 @@
                 <a:ea typeface="ヒラギノ丸ゴ Pro W4"/>
               </a:rPr>
               <a:pPr/>
-              <a:t>2017/10/11</a:t>
+              <a:t>2024/7/17</a:t>
             </a:fld>
             <a:endParaRPr kumimoji="1" lang="ja-JP" altLang="en-US" dirty="0">
               <a:latin typeface="Myriad Pro"/>
@@ -321,21 +321,21 @@
       </p:sp>
       <p:grpSp>
         <p:nvGrpSpPr>
-          <p:cNvPr id="16" name="図形グループ 15"/>
+          <p:cNvPr id="11" name="図形グループ 10"/>
           <p:cNvGrpSpPr/>
           <p:nvPr/>
         </p:nvGrpSpPr>
         <p:grpSpPr>
           <a:xfrm>
-            <a:off x="4342206" y="7740352"/>
-            <a:ext cx="2056613" cy="944861"/>
-            <a:chOff x="6172200" y="5181600"/>
+            <a:off x="4259244" y="7884368"/>
+            <a:ext cx="2206786" cy="1013854"/>
+            <a:chOff x="3124063" y="3398054"/>
             <a:chExt cx="2676990" cy="1229878"/>
           </a:xfrm>
         </p:grpSpPr>
         <p:sp>
           <p:nvSpPr>
-            <p:cNvPr id="17" name="Rectangle 8"/>
+            <p:cNvPr id="12" name="Rectangle 8"/>
             <p:cNvSpPr>
               <a:spLocks noChangeArrowheads="1"/>
             </p:cNvSpPr>
@@ -343,7 +343,7 @@
           </p:nvSpPr>
           <p:spPr bwMode="auto">
             <a:xfrm rot="20400000">
-              <a:off x="6172200" y="5822009"/>
+              <a:off x="3124063" y="4038463"/>
               <a:ext cx="540000" cy="540000"/>
             </a:xfrm>
             <a:prstGeom prst="rect">
@@ -354,10 +354,67 @@
               <a:gradFill flip="none" rotWithShape="1">
                 <a:gsLst>
                   <a:gs pos="0">
-                    <a:srgbClr val="F7B5B0"/>
+                    <a:srgbClr val="FF0000">
+                      <a:alpha val="30000"/>
+                    </a:srgbClr>
                   </a:gs>
                   <a:gs pos="100000">
-                    <a:srgbClr val="F7B5B0">
+                    <a:srgbClr val="FF0000">
+                      <a:alpha val="10000"/>
+                    </a:srgbClr>
+                  </a:gs>
+                </a:gsLst>
+                <a:lin ang="0" scaled="1"/>
+                <a:tileRect/>
+              </a:gradFill>
+              <a:miter lim="800000"/>
+              <a:headEnd/>
+              <a:tailEnd/>
+            </a:ln>
+            <a:effectLst>
+              <a:reflection stA="50000" endPos="75000" dist="12700" dir="5400000" sy="-100000" algn="bl" rotWithShape="0"/>
+            </a:effectLst>
+          </p:spPr>
+          <p:txBody>
+            <a:bodyPr wrap="none" anchor="ctr"/>
+            <a:lstStyle/>
+            <a:p>
+              <a:pPr>
+                <a:defRPr/>
+              </a:pPr>
+              <a:endParaRPr lang="ja-JP" altLang="en-US" dirty="0">
+                <a:ea typeface="ヒラギノ丸ゴ Pro W4"/>
+              </a:endParaRPr>
+            </a:p>
+          </p:txBody>
+        </p:sp>
+        <p:sp>
+          <p:nvSpPr>
+            <p:cNvPr id="13" name="Rectangle 8"/>
+            <p:cNvSpPr>
+              <a:spLocks noChangeArrowheads="1"/>
+            </p:cNvSpPr>
+            <p:nvPr userDrawn="1"/>
+          </p:nvSpPr>
+          <p:spPr bwMode="auto">
+            <a:xfrm rot="21300000">
+              <a:off x="3612975" y="3727932"/>
+              <a:ext cx="900000" cy="900000"/>
+            </a:xfrm>
+            <a:prstGeom prst="rect">
+              <a:avLst/>
+            </a:prstGeom>
+            <a:noFill/>
+            <a:ln w="76200">
+              <a:gradFill flip="none" rotWithShape="1">
+                <a:gsLst>
+                  <a:gs pos="0">
+                    <a:srgbClr val="FFFF00">
+                      <a:alpha val="50000"/>
+                    </a:srgbClr>
+                  </a:gs>
+                  <a:gs pos="100000">
+                    <a:srgbClr val="FFFF00">
                       <a:alpha val="25000"/>
                     </a:srgbClr>
                   </a:gs>
@@ -388,16 +445,16 @@
         </p:sp>
         <p:sp>
           <p:nvSpPr>
-            <p:cNvPr id="18" name="Rectangle 8"/>
+            <p:cNvPr id="14" name="Rectangle 8"/>
             <p:cNvSpPr>
               <a:spLocks noChangeArrowheads="1"/>
             </p:cNvSpPr>
             <p:nvPr userDrawn="1"/>
           </p:nvSpPr>
           <p:spPr bwMode="auto">
-            <a:xfrm rot="21300000">
-              <a:off x="6661112" y="5511478"/>
-              <a:ext cx="900000" cy="900000"/>
+            <a:xfrm rot="600000">
+              <a:off x="4164498" y="3583636"/>
+              <a:ext cx="990000" cy="990000"/>
             </a:xfrm>
             <a:prstGeom prst="rect">
               <a:avLst/>
@@ -407,13 +464,13 @@
               <a:gradFill flip="none" rotWithShape="1">
                 <a:gsLst>
                   <a:gs pos="0">
-                    <a:srgbClr val="FFFF00">
-                      <a:alpha val="50000"/>
+                    <a:srgbClr val="008000">
+                      <a:alpha val="30000"/>
                     </a:srgbClr>
                   </a:gs>
                   <a:gs pos="100000">
-                    <a:srgbClr val="F9F88E">
-                      <a:alpha val="15000"/>
+                    <a:srgbClr val="008000">
+                      <a:alpha val="10000"/>
                     </a:srgbClr>
                   </a:gs>
                 </a:gsLst>
@@ -443,60 +500,7 @@
         </p:sp>
         <p:sp>
           <p:nvSpPr>
-            <p:cNvPr id="19" name="Rectangle 8"/>
-            <p:cNvSpPr>
-              <a:spLocks noChangeArrowheads="1"/>
-            </p:cNvSpPr>
-            <p:nvPr userDrawn="1"/>
-          </p:nvSpPr>
-          <p:spPr bwMode="auto">
-            <a:xfrm rot="600000">
-              <a:off x="7212635" y="5367182"/>
-              <a:ext cx="990000" cy="990000"/>
-            </a:xfrm>
-            <a:prstGeom prst="rect">
-              <a:avLst/>
-            </a:prstGeom>
-            <a:noFill/>
-            <a:ln w="76200">
-              <a:gradFill flip="none" rotWithShape="1">
-                <a:gsLst>
-                  <a:gs pos="0">
-                    <a:srgbClr val="A3E6A5"/>
-                  </a:gs>
-                  <a:gs pos="100000">
-                    <a:srgbClr val="ACCFAD">
-                      <a:alpha val="15000"/>
-                    </a:srgbClr>
-                  </a:gs>
-                </a:gsLst>
-                <a:lin ang="0" scaled="1"/>
-                <a:tileRect/>
-              </a:gradFill>
-              <a:miter lim="800000"/>
-              <a:headEnd/>
-              <a:tailEnd/>
-            </a:ln>
-            <a:effectLst>
-              <a:reflection stA="50000" endPos="75000" dist="12700" dir="5400000" sy="-100000" algn="bl" rotWithShape="0"/>
-            </a:effectLst>
-          </p:spPr>
-          <p:txBody>
-            <a:bodyPr wrap="none" anchor="ctr"/>
-            <a:lstStyle/>
-            <a:p>
-              <a:pPr>
-                <a:defRPr/>
-              </a:pPr>
-              <a:endParaRPr lang="ja-JP" altLang="en-US" dirty="0">
-                <a:ea typeface="ヒラギノ丸ゴ Pro W4"/>
-              </a:endParaRPr>
-            </a:p>
-          </p:txBody>
-        </p:sp>
-        <p:sp>
-          <p:nvSpPr>
-            <p:cNvPr id="20" name="Rectangle 8"/>
+            <p:cNvPr id="15" name="Rectangle 8"/>
             <p:cNvSpPr>
               <a:spLocks noChangeArrowheads="1"/>
             </p:cNvSpPr>
@@ -504,7 +508,7 @@
           </p:nvSpPr>
           <p:spPr bwMode="auto">
             <a:xfrm rot="1800000">
-              <a:off x="7769190" y="5181600"/>
+              <a:off x="4721053" y="3398054"/>
               <a:ext cx="1080000" cy="1080000"/>
             </a:xfrm>
             <a:prstGeom prst="rect">
@@ -515,11 +519,13 @@
               <a:gradFill flip="none" rotWithShape="1">
                 <a:gsLst>
                   <a:gs pos="0">
-                    <a:srgbClr val="AEBAF7"/>
+                    <a:srgbClr val="0000FF">
+                      <a:alpha val="30000"/>
+                    </a:srgbClr>
                   </a:gs>
                   <a:gs pos="100000">
-                    <a:srgbClr val="AEBAF7">
-                      <a:alpha val="15000"/>
+                    <a:srgbClr val="0000FF">
+                      <a:alpha val="10000"/>
                     </a:srgbClr>
                   </a:gs>
                 </a:gsLst>
@@ -648,7 +654,7 @@
             <a:fld id="{CC64A06D-9B71-4CE4-BE9A-4B4486566249}" type="datetimeFigureOut">
               <a:rPr lang="ja-JP" altLang="en-US" smtClean="0"/>
               <a:pPr/>
-              <a:t>2017/10/11</a:t>
+              <a:t>2024/7/17</a:t>
             </a:fld>
             <a:endParaRPr lang="ja-JP" altLang="en-US" dirty="0"/>
           </a:p>
@@ -666,8 +672,8 @@
         </p:nvSpPr>
         <p:spPr>
           <a:xfrm>
-            <a:off x="1143000" y="685800"/>
-            <a:ext cx="4572000" cy="3429000"/>
+            <a:off x="381000" y="685800"/>
+            <a:ext cx="6096000" cy="3429000"/>
           </a:xfrm>
           <a:prstGeom prst="rect">
             <a:avLst/>
@@ -714,70 +720,69 @@
           <a:p>
             <a:pPr lvl="0"/>
             <a:r>
-              <a:rPr kumimoji="1" lang="ja-JP" altLang="en-US" dirty="0" smtClean="0"/>
+              <a:rPr kumimoji="1" lang="ja-JP" altLang="en-US" dirty="0"/>
               <a:t>マスタ テキストの書式設定</a:t>
             </a:r>
           </a:p>
           <a:p>
             <a:pPr lvl="1"/>
             <a:r>
-              <a:rPr kumimoji="1" lang="ja-JP" altLang="en-US" dirty="0" smtClean="0"/>
+              <a:rPr kumimoji="1" lang="ja-JP" altLang="en-US" dirty="0"/>
               <a:t>第 </a:t>
             </a:r>
             <a:r>
-              <a:rPr kumimoji="1" lang="en-US" altLang="ja-JP" dirty="0" smtClean="0"/>
+              <a:rPr kumimoji="1" lang="en-US" altLang="ja-JP" dirty="0"/>
               <a:t>2 </a:t>
             </a:r>
             <a:r>
-              <a:rPr kumimoji="1" lang="ja-JP" altLang="en-US" dirty="0" smtClean="0"/>
+              <a:rPr kumimoji="1" lang="ja-JP" altLang="en-US" dirty="0"/>
               <a:t>レベル</a:t>
             </a:r>
           </a:p>
           <a:p>
             <a:pPr lvl="2"/>
             <a:r>
-              <a:rPr kumimoji="1" lang="ja-JP" altLang="en-US" dirty="0" smtClean="0"/>
+              <a:rPr kumimoji="1" lang="ja-JP" altLang="en-US" dirty="0"/>
               <a:t>第 </a:t>
             </a:r>
             <a:r>
-              <a:rPr kumimoji="1" lang="en-US" altLang="ja-JP" dirty="0" smtClean="0"/>
+              <a:rPr kumimoji="1" lang="en-US" altLang="ja-JP" dirty="0"/>
               <a:t>3 </a:t>
             </a:r>
             <a:r>
-              <a:rPr kumimoji="1" lang="ja-JP" altLang="en-US" dirty="0" smtClean="0"/>
+              <a:rPr kumimoji="1" lang="ja-JP" altLang="en-US" dirty="0"/>
               <a:t>レベル</a:t>
             </a:r>
           </a:p>
           <a:p>
             <a:pPr lvl="3"/>
             <a:r>
-              <a:rPr kumimoji="1" lang="ja-JP" altLang="en-US" dirty="0" smtClean="0"/>
+              <a:rPr kumimoji="1" lang="ja-JP" altLang="en-US" dirty="0"/>
               <a:t>第 </a:t>
             </a:r>
             <a:r>
-              <a:rPr kumimoji="1" lang="en-US" altLang="ja-JP" dirty="0" smtClean="0"/>
+              <a:rPr kumimoji="1" lang="en-US" altLang="ja-JP" dirty="0"/>
               <a:t>4 </a:t>
             </a:r>
             <a:r>
-              <a:rPr kumimoji="1" lang="ja-JP" altLang="en-US" dirty="0" smtClean="0"/>
+              <a:rPr kumimoji="1" lang="ja-JP" altLang="en-US" dirty="0"/>
               <a:t>レベル</a:t>
             </a:r>
           </a:p>
           <a:p>
             <a:pPr lvl="4"/>
             <a:r>
-              <a:rPr kumimoji="1" lang="ja-JP" altLang="en-US" dirty="0" smtClean="0"/>
+              <a:rPr kumimoji="1" lang="ja-JP" altLang="en-US" dirty="0"/>
               <a:t>第 </a:t>
             </a:r>
             <a:r>
-              <a:rPr kumimoji="1" lang="en-US" altLang="ja-JP" dirty="0" smtClean="0"/>
+              <a:rPr kumimoji="1" lang="en-US" altLang="ja-JP" dirty="0"/>
               <a:t>5 </a:t>
             </a:r>
             <a:r>
-              <a:rPr kumimoji="1" lang="ja-JP" altLang="en-US" dirty="0" smtClean="0"/>
+              <a:rPr kumimoji="1" lang="ja-JP" altLang="en-US" dirty="0"/>
               <a:t>レベル</a:t>
             </a:r>
-            <a:endParaRPr kumimoji="1" lang="ja-JP" altLang="en-US" dirty="0"/>
           </a:p>
         </p:txBody>
       </p:sp>
@@ -986,8 +991,8 @@
         </p:nvSpPr>
         <p:spPr>
           <a:xfrm>
-            <a:off x="685800" y="2428868"/>
-            <a:ext cx="7772400" cy="640092"/>
+            <a:off x="914400" y="2428868"/>
+            <a:ext cx="10363200" cy="640092"/>
           </a:xfrm>
         </p:spPr>
         <p:txBody>
@@ -995,7 +1000,7 @@
           <a:lstStyle/>
           <a:p>
             <a:r>
-              <a:rPr kumimoji="1" lang="ja-JP" altLang="en-US" smtClean="0"/>
+              <a:rPr kumimoji="1" lang="ja-JP" altLang="en-US"/>
               <a:t>マスター タイトルの書式設定</a:t>
             </a:r>
             <a:endParaRPr kumimoji="1" lang="ja-JP" altLang="en-US" dirty="0"/>
@@ -1014,8 +1019,8 @@
         </p:nvSpPr>
         <p:spPr>
           <a:xfrm>
-            <a:off x="2786050" y="3500438"/>
-            <a:ext cx="5686420" cy="785818"/>
+            <a:off x="3714735" y="3500438"/>
+            <a:ext cx="7581893" cy="785818"/>
           </a:xfrm>
         </p:spPr>
         <p:txBody>
@@ -1117,7 +1122,7 @@
           </a:lstStyle>
           <a:p>
             <a:r>
-              <a:rPr kumimoji="1" lang="ja-JP" altLang="en-US" smtClean="0"/>
+              <a:rPr kumimoji="1" lang="ja-JP" altLang="en-US"/>
               <a:t>マスター サブタイトルの書式設定</a:t>
             </a:r>
             <a:endParaRPr kumimoji="1" lang="ja-JP" altLang="en-US" dirty="0"/>
@@ -1132,8 +1137,8 @@
         </p:nvCxnSpPr>
         <p:spPr>
           <a:xfrm>
-            <a:off x="714348" y="3071810"/>
-            <a:ext cx="7715304" cy="1588"/>
+            <a:off x="952464" y="3071810"/>
+            <a:ext cx="10287072" cy="1588"/>
           </a:xfrm>
           <a:prstGeom prst="line">
             <a:avLst/>
@@ -1181,8 +1186,8 @@
         </p:nvSpPr>
         <p:spPr>
           <a:xfrm>
-            <a:off x="5364088" y="5786454"/>
-            <a:ext cx="3137002" cy="461665"/>
+            <a:off x="7152119" y="5786457"/>
+            <a:ext cx="4182669" cy="461665"/>
           </a:xfrm>
           <a:prstGeom prst="rect">
             <a:avLst/>
@@ -1197,7 +1202,7 @@
           <a:p>
             <a:pPr algn="r"/>
             <a:r>
-              <a:rPr kumimoji="1" lang="en-US" altLang="ja-JP" sz="1200" dirty="0" smtClean="0">
+              <a:rPr kumimoji="1" lang="en-US" altLang="ja-JP" sz="1200" dirty="0">
                 <a:solidFill>
                   <a:schemeClr val="tx1">
                     <a:lumMod val="65000"/>
@@ -1209,7 +1214,7 @@
               <a:t>TAKAHASHI</a:t>
             </a:r>
             <a:r>
-              <a:rPr kumimoji="1" lang="en-US" altLang="ja-JP" sz="1200" baseline="0" dirty="0" smtClean="0">
+              <a:rPr kumimoji="1" lang="en-US" altLang="ja-JP" sz="1200" baseline="0" dirty="0">
                 <a:solidFill>
                   <a:schemeClr val="tx1">
                     <a:lumMod val="65000"/>
@@ -1221,7 +1226,7 @@
               <a:t> </a:t>
             </a:r>
             <a:r>
-              <a:rPr kumimoji="1" lang="en-US" altLang="ja-JP" sz="1200" baseline="0" dirty="0" err="1" smtClean="0">
+              <a:rPr kumimoji="1" lang="en-US" altLang="ja-JP" sz="1200" baseline="0" dirty="0" err="1">
                 <a:solidFill>
                   <a:schemeClr val="tx1">
                     <a:lumMod val="65000"/>
@@ -1233,7 +1238,7 @@
               <a:t>Kyohei</a:t>
             </a:r>
             <a:r>
-              <a:rPr kumimoji="1" lang="en-US" altLang="ja-JP" sz="1200" baseline="0" dirty="0" smtClean="0">
+              <a:rPr kumimoji="1" lang="en-US" altLang="ja-JP" sz="1200" baseline="0" dirty="0">
                 <a:solidFill>
                   <a:schemeClr val="tx1">
                     <a:lumMod val="65000"/>
@@ -1245,7 +1250,7 @@
               <a:t> &lt;</a:t>
             </a:r>
             <a:r>
-              <a:rPr kumimoji="1" lang="en-US" altLang="ja-JP" sz="1200" baseline="0" dirty="0" err="1" smtClean="0">
+              <a:rPr kumimoji="1" lang="en-US" altLang="ja-JP" sz="1200" baseline="0" dirty="0" err="1">
                 <a:solidFill>
                   <a:schemeClr val="tx1">
                     <a:lumMod val="65000"/>
@@ -1257,7 +1262,7 @@
               <a:t>kcrt@kcrt.net</a:t>
             </a:r>
             <a:r>
-              <a:rPr kumimoji="1" lang="en-US" altLang="ja-JP" sz="1200" baseline="0" dirty="0" smtClean="0">
+              <a:rPr kumimoji="1" lang="en-US" altLang="ja-JP" sz="1200" baseline="0" dirty="0">
                 <a:solidFill>
                   <a:schemeClr val="tx1">
                     <a:lumMod val="65000"/>
@@ -1281,7 +1286,7 @@
                 </a:solidFill>
                 <a:ea typeface="ヒラギノ丸ゴ Pro W4"/>
               </a:rPr>
-              <a:t>2017/10/11</a:t>
+              <a:t>2024/07/17</a:t>
             </a:fld>
             <a:endParaRPr kumimoji="1" lang="ja-JP" altLang="en-US" sz="1200" dirty="0">
               <a:solidFill>
@@ -1297,21 +1302,33 @@
       </p:sp>
       <p:grpSp>
         <p:nvGrpSpPr>
-          <p:cNvPr id="11" name="図形グループ 10"/>
+          <p:cNvPr id="11" name="図形グループ 13">
+            <a:extLst>
+              <a:ext uri="{FF2B5EF4-FFF2-40B4-BE49-F238E27FC236}">
+                <a16:creationId xmlns:a16="http://schemas.microsoft.com/office/drawing/2014/main" id="{A1D9C500-45E0-F34F-81CD-69C546C6F5F0}"/>
+              </a:ext>
+            </a:extLst>
+          </p:cNvPr>
           <p:cNvGrpSpPr/>
           <p:nvPr userDrawn="1"/>
         </p:nvGrpSpPr>
         <p:grpSpPr>
           <a:xfrm>
-            <a:off x="395536" y="369432"/>
+            <a:off x="381000" y="304800"/>
             <a:ext cx="2676990" cy="1229878"/>
-            <a:chOff x="6172200" y="5181600"/>
+            <a:chOff x="3124063" y="3398054"/>
             <a:chExt cx="2676990" cy="1229878"/>
           </a:xfrm>
         </p:grpSpPr>
         <p:sp>
           <p:nvSpPr>
-            <p:cNvPr id="12" name="Rectangle 8"/>
+            <p:cNvPr id="12" name="Rectangle 8">
+              <a:extLst>
+                <a:ext uri="{FF2B5EF4-FFF2-40B4-BE49-F238E27FC236}">
+                  <a16:creationId xmlns:a16="http://schemas.microsoft.com/office/drawing/2014/main" id="{D394C70D-E77F-DA47-8BD9-74446B65CD40}"/>
+                </a:ext>
+              </a:extLst>
+            </p:cNvPr>
             <p:cNvSpPr>
               <a:spLocks noChangeArrowheads="1"/>
             </p:cNvSpPr>
@@ -1319,7 +1336,7 @@
           </p:nvSpPr>
           <p:spPr bwMode="auto">
             <a:xfrm rot="20400000">
-              <a:off x="6172200" y="5822009"/>
+              <a:off x="3124063" y="4038463"/>
               <a:ext cx="540000" cy="540000"/>
             </a:xfrm>
             <a:prstGeom prst="rect">
@@ -1330,10 +1347,73 @@
               <a:gradFill flip="none" rotWithShape="1">
                 <a:gsLst>
                   <a:gs pos="0">
-                    <a:srgbClr val="F7B5B0"/>
+                    <a:srgbClr val="FF0000">
+                      <a:alpha val="30000"/>
+                    </a:srgbClr>
                   </a:gs>
                   <a:gs pos="100000">
-                    <a:srgbClr val="F7B5B0">
+                    <a:srgbClr val="FF0000">
+                      <a:alpha val="10000"/>
+                    </a:srgbClr>
+                  </a:gs>
+                </a:gsLst>
+                <a:lin ang="0" scaled="1"/>
+                <a:tileRect/>
+              </a:gradFill>
+              <a:miter lim="800000"/>
+              <a:headEnd/>
+              <a:tailEnd/>
+            </a:ln>
+            <a:effectLst>
+              <a:reflection stA="50000" endPos="75000" dist="12700" dir="5400000" sy="-100000" algn="bl" rotWithShape="0"/>
+            </a:effectLst>
+          </p:spPr>
+          <p:txBody>
+            <a:bodyPr wrap="none" anchor="ctr"/>
+            <a:lstStyle/>
+            <a:p>
+              <a:pPr>
+                <a:defRPr/>
+              </a:pPr>
+              <a:endParaRPr lang="ja-JP" altLang="en-US" sz="1800" dirty="0">
+                <a:ea typeface="ヒラギノ丸ゴ Pro W4"/>
+              </a:endParaRPr>
+            </a:p>
+          </p:txBody>
+        </p:sp>
+        <p:sp>
+          <p:nvSpPr>
+            <p:cNvPr id="13" name="Rectangle 8">
+              <a:extLst>
+                <a:ext uri="{FF2B5EF4-FFF2-40B4-BE49-F238E27FC236}">
+                  <a16:creationId xmlns:a16="http://schemas.microsoft.com/office/drawing/2014/main" id="{2BA4FDB1-BFB6-4745-A0E1-C69BAC2473D1}"/>
+                </a:ext>
+              </a:extLst>
+            </p:cNvPr>
+            <p:cNvSpPr>
+              <a:spLocks noChangeArrowheads="1"/>
+            </p:cNvSpPr>
+            <p:nvPr userDrawn="1"/>
+          </p:nvSpPr>
+          <p:spPr bwMode="auto">
+            <a:xfrm rot="21300000">
+              <a:off x="3612975" y="3727932"/>
+              <a:ext cx="900000" cy="900000"/>
+            </a:xfrm>
+            <a:prstGeom prst="rect">
+              <a:avLst/>
+            </a:prstGeom>
+            <a:noFill/>
+            <a:ln w="76200">
+              <a:gradFill flip="none" rotWithShape="1">
+                <a:gsLst>
+                  <a:gs pos="0">
+                    <a:srgbClr val="FFFF00">
+                      <a:alpha val="50000"/>
+                    </a:srgbClr>
+                  </a:gs>
+                  <a:gs pos="100000">
+                    <a:srgbClr val="FFFF00">
                       <a:alpha val="25000"/>
                     </a:srgbClr>
                   </a:gs>
@@ -1356,7 +1436,7 @@
               <a:pPr>
                 <a:defRPr/>
               </a:pPr>
-              <a:endParaRPr lang="ja-JP" altLang="en-US" dirty="0">
+              <a:endParaRPr lang="ja-JP" altLang="en-US" sz="1800" dirty="0">
                 <a:ea typeface="ヒラギノ丸ゴ Pro W4"/>
               </a:endParaRPr>
             </a:p>
@@ -1364,16 +1444,22 @@
         </p:sp>
         <p:sp>
           <p:nvSpPr>
-            <p:cNvPr id="13" name="Rectangle 8"/>
+            <p:cNvPr id="20" name="Rectangle 8">
+              <a:extLst>
+                <a:ext uri="{FF2B5EF4-FFF2-40B4-BE49-F238E27FC236}">
+                  <a16:creationId xmlns:a16="http://schemas.microsoft.com/office/drawing/2014/main" id="{7E096169-55D7-724D-A9B1-9FC6F911D01E}"/>
+                </a:ext>
+              </a:extLst>
+            </p:cNvPr>
             <p:cNvSpPr>
               <a:spLocks noChangeArrowheads="1"/>
             </p:cNvSpPr>
             <p:nvPr userDrawn="1"/>
           </p:nvSpPr>
           <p:spPr bwMode="auto">
-            <a:xfrm rot="21300000">
-              <a:off x="6661112" y="5511478"/>
-              <a:ext cx="900000" cy="900000"/>
+            <a:xfrm rot="600000">
+              <a:off x="4164498" y="3583636"/>
+              <a:ext cx="990000" cy="990000"/>
             </a:xfrm>
             <a:prstGeom prst="rect">
               <a:avLst/>
@@ -1383,13 +1469,13 @@
               <a:gradFill flip="none" rotWithShape="1">
                 <a:gsLst>
                   <a:gs pos="0">
-                    <a:srgbClr val="FFFF00">
-                      <a:alpha val="50000"/>
+                    <a:srgbClr val="008000">
+                      <a:alpha val="30000"/>
                     </a:srgbClr>
                   </a:gs>
                   <a:gs pos="100000">
-                    <a:srgbClr val="F9F88E">
-                      <a:alpha val="15000"/>
+                    <a:srgbClr val="008000">
+                      <a:alpha val="10000"/>
                     </a:srgbClr>
                   </a:gs>
                 </a:gsLst>
@@ -1411,7 +1497,7 @@
               <a:pPr>
                 <a:defRPr/>
               </a:pPr>
-              <a:endParaRPr lang="ja-JP" altLang="en-US" dirty="0">
+              <a:endParaRPr lang="ja-JP" altLang="en-US" sz="1800" dirty="0">
                 <a:ea typeface="ヒラギノ丸ゴ Pro W4"/>
               </a:endParaRPr>
             </a:p>
@@ -1419,16 +1505,22 @@
         </p:sp>
         <p:sp>
           <p:nvSpPr>
-            <p:cNvPr id="20" name="Rectangle 8"/>
+            <p:cNvPr id="21" name="Rectangle 8">
+              <a:extLst>
+                <a:ext uri="{FF2B5EF4-FFF2-40B4-BE49-F238E27FC236}">
+                  <a16:creationId xmlns:a16="http://schemas.microsoft.com/office/drawing/2014/main" id="{41C4ECDD-060F-0F49-9C5C-74630D526E75}"/>
+                </a:ext>
+              </a:extLst>
+            </p:cNvPr>
             <p:cNvSpPr>
               <a:spLocks noChangeArrowheads="1"/>
             </p:cNvSpPr>
             <p:nvPr userDrawn="1"/>
           </p:nvSpPr>
           <p:spPr bwMode="auto">
-            <a:xfrm rot="600000">
-              <a:off x="7212635" y="5367182"/>
-              <a:ext cx="990000" cy="990000"/>
+            <a:xfrm rot="1800000">
+              <a:off x="4721053" y="3398054"/>
+              <a:ext cx="1080000" cy="1080000"/>
             </a:xfrm>
             <a:prstGeom prst="rect">
               <a:avLst/>
@@ -1438,11 +1530,13 @@
               <a:gradFill flip="none" rotWithShape="1">
                 <a:gsLst>
                   <a:gs pos="0">
-                    <a:srgbClr val="A3E6A5"/>
+                    <a:srgbClr val="0000FF">
+                      <a:alpha val="30000"/>
+                    </a:srgbClr>
                   </a:gs>
                   <a:gs pos="100000">
-                    <a:srgbClr val="ACCFAD">
-                      <a:alpha val="15000"/>
+                    <a:srgbClr val="0000FF">
+                      <a:alpha val="10000"/>
                     </a:srgbClr>
                   </a:gs>
                 </a:gsLst>
@@ -1464,60 +1558,7 @@
               <a:pPr>
                 <a:defRPr/>
               </a:pPr>
-              <a:endParaRPr lang="ja-JP" altLang="en-US" dirty="0">
-                <a:ea typeface="ヒラギノ丸ゴ Pro W4"/>
-              </a:endParaRPr>
-            </a:p>
-          </p:txBody>
-        </p:sp>
-        <p:sp>
-          <p:nvSpPr>
-            <p:cNvPr id="21" name="Rectangle 8"/>
-            <p:cNvSpPr>
-              <a:spLocks noChangeArrowheads="1"/>
-            </p:cNvSpPr>
-            <p:nvPr userDrawn="1"/>
-          </p:nvSpPr>
-          <p:spPr bwMode="auto">
-            <a:xfrm rot="1800000">
-              <a:off x="7769190" y="5181600"/>
-              <a:ext cx="1080000" cy="1080000"/>
-            </a:xfrm>
-            <a:prstGeom prst="rect">
-              <a:avLst/>
-            </a:prstGeom>
-            <a:noFill/>
-            <a:ln w="76200">
-              <a:gradFill flip="none" rotWithShape="1">
-                <a:gsLst>
-                  <a:gs pos="0">
-                    <a:srgbClr val="AEBAF7"/>
-                  </a:gs>
-                  <a:gs pos="100000">
-                    <a:srgbClr val="AEBAF7">
-                      <a:alpha val="15000"/>
-                    </a:srgbClr>
-                  </a:gs>
-                </a:gsLst>
-                <a:lin ang="0" scaled="1"/>
-                <a:tileRect/>
-              </a:gradFill>
-              <a:miter lim="800000"/>
-              <a:headEnd/>
-              <a:tailEnd/>
-            </a:ln>
-            <a:effectLst>
-              <a:reflection stA="50000" endPos="75000" dist="12700" dir="5400000" sy="-100000" algn="bl" rotWithShape="0"/>
-            </a:effectLst>
-          </p:spPr>
-          <p:txBody>
-            <a:bodyPr wrap="none" anchor="ctr"/>
-            <a:lstStyle/>
-            <a:p>
-              <a:pPr>
-                <a:defRPr/>
-              </a:pPr>
-              <a:endParaRPr lang="ja-JP" altLang="en-US" dirty="0">
+              <a:endParaRPr lang="ja-JP" altLang="en-US" sz="1800" dirty="0">
                 <a:ea typeface="ヒラギノ丸ゴ Pro W4"/>
               </a:endParaRPr>
             </a:p>
@@ -1529,13 +1570,6 @@
   <p:clrMapOvr>
     <a:masterClrMapping/>
   </p:clrMapOvr>
-  <p:timing>
-    <p:tnLst>
-      <p:par>
-        <p:cTn id="1" dur="indefinite" restart="never" nodeType="tmRoot"/>
-      </p:par>
-    </p:tnLst>
-  </p:timing>
 </p:sldLayout>
 </file>
 
@@ -1568,8 +1602,8 @@
         </p:nvSpPr>
         <p:spPr>
           <a:xfrm>
-            <a:off x="785786" y="2786058"/>
-            <a:ext cx="7772400" cy="642942"/>
+            <a:off x="1047715" y="2786058"/>
+            <a:ext cx="10363200" cy="642942"/>
           </a:xfrm>
         </p:spPr>
         <p:txBody>
@@ -1577,7 +1611,7 @@
           <a:lstStyle/>
           <a:p>
             <a:r>
-              <a:rPr kumimoji="1" lang="ja-JP" altLang="en-US" smtClean="0"/>
+              <a:rPr kumimoji="1" lang="ja-JP" altLang="en-US"/>
               <a:t>マスター タイトルの書式設定</a:t>
             </a:r>
             <a:endParaRPr kumimoji="1" lang="ja-JP" altLang="en-US" dirty="0"/>
@@ -1592,8 +1626,8 @@
         </p:nvCxnSpPr>
         <p:spPr>
           <a:xfrm>
-            <a:off x="714348" y="3427412"/>
-            <a:ext cx="7715304" cy="1588"/>
+            <a:off x="952464" y="3427412"/>
+            <a:ext cx="10287072" cy="1588"/>
           </a:xfrm>
           <a:prstGeom prst="line">
             <a:avLst/>
@@ -1635,21 +1669,33 @@
       </p:cxnSp>
       <p:grpSp>
         <p:nvGrpSpPr>
-          <p:cNvPr id="9" name="図形グループ 8"/>
+          <p:cNvPr id="9" name="図形グループ 13">
+            <a:extLst>
+              <a:ext uri="{FF2B5EF4-FFF2-40B4-BE49-F238E27FC236}">
+                <a16:creationId xmlns:a16="http://schemas.microsoft.com/office/drawing/2014/main" id="{943B2D04-4690-C34C-A167-6CC5A92FF73E}"/>
+              </a:ext>
+            </a:extLst>
+          </p:cNvPr>
           <p:cNvGrpSpPr/>
           <p:nvPr userDrawn="1"/>
         </p:nvGrpSpPr>
         <p:grpSpPr>
           <a:xfrm>
-            <a:off x="395536" y="369432"/>
+            <a:off x="381000" y="304800"/>
             <a:ext cx="2676990" cy="1229878"/>
-            <a:chOff x="6172200" y="5181600"/>
+            <a:chOff x="3124063" y="3398054"/>
             <a:chExt cx="2676990" cy="1229878"/>
           </a:xfrm>
         </p:grpSpPr>
         <p:sp>
           <p:nvSpPr>
-            <p:cNvPr id="10" name="Rectangle 8"/>
+            <p:cNvPr id="10" name="Rectangle 8">
+              <a:extLst>
+                <a:ext uri="{FF2B5EF4-FFF2-40B4-BE49-F238E27FC236}">
+                  <a16:creationId xmlns:a16="http://schemas.microsoft.com/office/drawing/2014/main" id="{7EA62888-F40E-1D4B-83BA-4E2CA11A1E89}"/>
+                </a:ext>
+              </a:extLst>
+            </p:cNvPr>
             <p:cNvSpPr>
               <a:spLocks noChangeArrowheads="1"/>
             </p:cNvSpPr>
@@ -1657,7 +1703,7 @@
           </p:nvSpPr>
           <p:spPr bwMode="auto">
             <a:xfrm rot="20400000">
-              <a:off x="6172200" y="5822009"/>
+              <a:off x="3124063" y="4038463"/>
               <a:ext cx="540000" cy="540000"/>
             </a:xfrm>
             <a:prstGeom prst="rect">
@@ -1668,10 +1714,73 @@
               <a:gradFill flip="none" rotWithShape="1">
                 <a:gsLst>
                   <a:gs pos="0">
-                    <a:srgbClr val="F7B5B0"/>
+                    <a:srgbClr val="FF0000">
+                      <a:alpha val="30000"/>
+                    </a:srgbClr>
                   </a:gs>
                   <a:gs pos="100000">
-                    <a:srgbClr val="F7B5B0">
+                    <a:srgbClr val="FF0000">
+                      <a:alpha val="10000"/>
+                    </a:srgbClr>
+                  </a:gs>
+                </a:gsLst>
+                <a:lin ang="0" scaled="1"/>
+                <a:tileRect/>
+              </a:gradFill>
+              <a:miter lim="800000"/>
+              <a:headEnd/>
+              <a:tailEnd/>
+            </a:ln>
+            <a:effectLst>
+              <a:reflection stA="50000" endPos="75000" dist="12700" dir="5400000" sy="-100000" algn="bl" rotWithShape="0"/>
+            </a:effectLst>
+          </p:spPr>
+          <p:txBody>
+            <a:bodyPr wrap="none" anchor="ctr"/>
+            <a:lstStyle/>
+            <a:p>
+              <a:pPr>
+                <a:defRPr/>
+              </a:pPr>
+              <a:endParaRPr lang="ja-JP" altLang="en-US" sz="1800" dirty="0">
+                <a:ea typeface="ヒラギノ丸ゴ Pro W4"/>
+              </a:endParaRPr>
+            </a:p>
+          </p:txBody>
+        </p:sp>
+        <p:sp>
+          <p:nvSpPr>
+            <p:cNvPr id="11" name="Rectangle 8">
+              <a:extLst>
+                <a:ext uri="{FF2B5EF4-FFF2-40B4-BE49-F238E27FC236}">
+                  <a16:creationId xmlns:a16="http://schemas.microsoft.com/office/drawing/2014/main" id="{E418A19F-489F-7B4E-8EFB-5BA52B16EEF3}"/>
+                </a:ext>
+              </a:extLst>
+            </p:cNvPr>
+            <p:cNvSpPr>
+              <a:spLocks noChangeArrowheads="1"/>
+            </p:cNvSpPr>
+            <p:nvPr userDrawn="1"/>
+          </p:nvSpPr>
+          <p:spPr bwMode="auto">
+            <a:xfrm rot="21300000">
+              <a:off x="3612975" y="3727932"/>
+              <a:ext cx="900000" cy="900000"/>
+            </a:xfrm>
+            <a:prstGeom prst="rect">
+              <a:avLst/>
+            </a:prstGeom>
+            <a:noFill/>
+            <a:ln w="76200">
+              <a:gradFill flip="none" rotWithShape="1">
+                <a:gsLst>
+                  <a:gs pos="0">
+                    <a:srgbClr val="FFFF00">
+                      <a:alpha val="50000"/>
+                    </a:srgbClr>
+                  </a:gs>
+                  <a:gs pos="100000">
+                    <a:srgbClr val="FFFF00">
                       <a:alpha val="25000"/>
                     </a:srgbClr>
                   </a:gs>
@@ -1694,7 +1803,7 @@
               <a:pPr>
                 <a:defRPr/>
               </a:pPr>
-              <a:endParaRPr lang="ja-JP" altLang="en-US" dirty="0">
+              <a:endParaRPr lang="ja-JP" altLang="en-US" sz="1800" dirty="0">
                 <a:ea typeface="ヒラギノ丸ゴ Pro W4"/>
               </a:endParaRPr>
             </a:p>
@@ -1702,16 +1811,22 @@
         </p:sp>
         <p:sp>
           <p:nvSpPr>
-            <p:cNvPr id="11" name="Rectangle 8"/>
+            <p:cNvPr id="12" name="Rectangle 8">
+              <a:extLst>
+                <a:ext uri="{FF2B5EF4-FFF2-40B4-BE49-F238E27FC236}">
+                  <a16:creationId xmlns:a16="http://schemas.microsoft.com/office/drawing/2014/main" id="{7A60895C-31A8-6047-AE99-3C4BE8E6E764}"/>
+                </a:ext>
+              </a:extLst>
+            </p:cNvPr>
             <p:cNvSpPr>
               <a:spLocks noChangeArrowheads="1"/>
             </p:cNvSpPr>
             <p:nvPr userDrawn="1"/>
           </p:nvSpPr>
           <p:spPr bwMode="auto">
-            <a:xfrm rot="21300000">
-              <a:off x="6661112" y="5511478"/>
-              <a:ext cx="900000" cy="900000"/>
+            <a:xfrm rot="600000">
+              <a:off x="4164498" y="3583636"/>
+              <a:ext cx="990000" cy="990000"/>
             </a:xfrm>
             <a:prstGeom prst="rect">
               <a:avLst/>
@@ -1721,13 +1836,13 @@
               <a:gradFill flip="none" rotWithShape="1">
                 <a:gsLst>
                   <a:gs pos="0">
-                    <a:srgbClr val="FFFF00">
-                      <a:alpha val="50000"/>
+                    <a:srgbClr val="008000">
+                      <a:alpha val="30000"/>
                     </a:srgbClr>
                   </a:gs>
                   <a:gs pos="100000">
-                    <a:srgbClr val="F9F88E">
-                      <a:alpha val="15000"/>
+                    <a:srgbClr val="008000">
+                      <a:alpha val="10000"/>
                     </a:srgbClr>
                   </a:gs>
                 </a:gsLst>
@@ -1749,7 +1864,7 @@
               <a:pPr>
                 <a:defRPr/>
               </a:pPr>
-              <a:endParaRPr lang="ja-JP" altLang="en-US" dirty="0">
+              <a:endParaRPr lang="ja-JP" altLang="en-US" sz="1800" dirty="0">
                 <a:ea typeface="ヒラギノ丸ゴ Pro W4"/>
               </a:endParaRPr>
             </a:p>
@@ -1757,16 +1872,22 @@
         </p:sp>
         <p:sp>
           <p:nvSpPr>
-            <p:cNvPr id="12" name="Rectangle 8"/>
+            <p:cNvPr id="13" name="Rectangle 8">
+              <a:extLst>
+                <a:ext uri="{FF2B5EF4-FFF2-40B4-BE49-F238E27FC236}">
+                  <a16:creationId xmlns:a16="http://schemas.microsoft.com/office/drawing/2014/main" id="{D3CC2AD7-06F1-7142-9D5E-B6E41DE6921F}"/>
+                </a:ext>
+              </a:extLst>
+            </p:cNvPr>
             <p:cNvSpPr>
               <a:spLocks noChangeArrowheads="1"/>
             </p:cNvSpPr>
             <p:nvPr userDrawn="1"/>
           </p:nvSpPr>
           <p:spPr bwMode="auto">
-            <a:xfrm rot="600000">
-              <a:off x="7212635" y="5367182"/>
-              <a:ext cx="990000" cy="990000"/>
+            <a:xfrm rot="1800000">
+              <a:off x="4721053" y="3398054"/>
+              <a:ext cx="1080000" cy="1080000"/>
             </a:xfrm>
             <a:prstGeom prst="rect">
               <a:avLst/>
@@ -1776,11 +1897,13 @@
               <a:gradFill flip="none" rotWithShape="1">
                 <a:gsLst>
                   <a:gs pos="0">
-                    <a:srgbClr val="A3E6A5"/>
+                    <a:srgbClr val="0000FF">
+                      <a:alpha val="30000"/>
+                    </a:srgbClr>
                   </a:gs>
                   <a:gs pos="100000">
-                    <a:srgbClr val="ACCFAD">
-                      <a:alpha val="15000"/>
+                    <a:srgbClr val="0000FF">
+                      <a:alpha val="10000"/>
                     </a:srgbClr>
                   </a:gs>
                 </a:gsLst>
@@ -1802,60 +1925,7 @@
               <a:pPr>
                 <a:defRPr/>
               </a:pPr>
-              <a:endParaRPr lang="ja-JP" altLang="en-US" dirty="0">
-                <a:ea typeface="ヒラギノ丸ゴ Pro W4"/>
-              </a:endParaRPr>
-            </a:p>
-          </p:txBody>
-        </p:sp>
-        <p:sp>
-          <p:nvSpPr>
-            <p:cNvPr id="13" name="Rectangle 8"/>
-            <p:cNvSpPr>
-              <a:spLocks noChangeArrowheads="1"/>
-            </p:cNvSpPr>
-            <p:nvPr userDrawn="1"/>
-          </p:nvSpPr>
-          <p:spPr bwMode="auto">
-            <a:xfrm rot="1800000">
-              <a:off x="7769190" y="5181600"/>
-              <a:ext cx="1080000" cy="1080000"/>
-            </a:xfrm>
-            <a:prstGeom prst="rect">
-              <a:avLst/>
-            </a:prstGeom>
-            <a:noFill/>
-            <a:ln w="76200">
-              <a:gradFill flip="none" rotWithShape="1">
-                <a:gsLst>
-                  <a:gs pos="0">
-                    <a:srgbClr val="AEBAF7"/>
-                  </a:gs>
-                  <a:gs pos="100000">
-                    <a:srgbClr val="AEBAF7">
-                      <a:alpha val="15000"/>
-                    </a:srgbClr>
-                  </a:gs>
-                </a:gsLst>
-                <a:lin ang="0" scaled="1"/>
-                <a:tileRect/>
-              </a:gradFill>
-              <a:miter lim="800000"/>
-              <a:headEnd/>
-              <a:tailEnd/>
-            </a:ln>
-            <a:effectLst>
-              <a:reflection stA="50000" endPos="75000" dist="12700" dir="5400000" sy="-100000" algn="bl" rotWithShape="0"/>
-            </a:effectLst>
-          </p:spPr>
-          <p:txBody>
-            <a:bodyPr wrap="none" anchor="ctr"/>
-            <a:lstStyle/>
-            <a:p>
-              <a:pPr>
-                <a:defRPr/>
-              </a:pPr>
-              <a:endParaRPr lang="ja-JP" altLang="en-US" dirty="0">
+              <a:endParaRPr lang="ja-JP" altLang="en-US" sz="1800" dirty="0">
                 <a:ea typeface="ヒラギノ丸ゴ Pro W4"/>
               </a:endParaRPr>
             </a:p>
@@ -1867,13 +1937,6 @@
   <p:clrMapOvr>
     <a:masterClrMapping/>
   </p:clrMapOvr>
-  <p:timing>
-    <p:tnLst>
-      <p:par>
-        <p:cTn id="1" dur="indefinite" restart="never" nodeType="tmRoot"/>
-      </p:par>
-    </p:tnLst>
-  </p:timing>
 </p:sldLayout>
 </file>
 
@@ -1910,10 +1973,9 @@
           <a:lstStyle/>
           <a:p>
             <a:r>
-              <a:rPr kumimoji="1" lang="ja-JP" altLang="en-US" smtClean="0"/>
+              <a:rPr kumimoji="1" lang="ja-JP" altLang="en-US"/>
               <a:t>マスター タイトルの書式設定</a:t>
             </a:r>
-            <a:endParaRPr kumimoji="1" lang="ja-JP" altLang="en-US"/>
           </a:p>
         </p:txBody>
       </p:sp>
@@ -1934,70 +1996,69 @@
           <a:p>
             <a:pPr lvl="0"/>
             <a:r>
-              <a:rPr kumimoji="1" lang="ja-JP" altLang="en-US" smtClean="0"/>
+              <a:rPr kumimoji="1" lang="ja-JP" altLang="en-US"/>
               <a:t>マスター テキストの書式設定</a:t>
             </a:r>
           </a:p>
           <a:p>
             <a:pPr lvl="1"/>
             <a:r>
-              <a:rPr kumimoji="1" lang="ja-JP" altLang="en-US" smtClean="0"/>
+              <a:rPr kumimoji="1" lang="ja-JP" altLang="en-US"/>
               <a:t>第 </a:t>
             </a:r>
             <a:r>
-              <a:rPr kumimoji="1" lang="en-US" altLang="ja-JP" smtClean="0"/>
+              <a:rPr kumimoji="1" lang="en-US" altLang="ja-JP"/>
               <a:t>2 </a:t>
             </a:r>
             <a:r>
-              <a:rPr kumimoji="1" lang="ja-JP" altLang="en-US" smtClean="0"/>
+              <a:rPr kumimoji="1" lang="ja-JP" altLang="en-US"/>
               <a:t>レベル</a:t>
             </a:r>
           </a:p>
           <a:p>
             <a:pPr lvl="2"/>
             <a:r>
-              <a:rPr kumimoji="1" lang="ja-JP" altLang="en-US" smtClean="0"/>
+              <a:rPr kumimoji="1" lang="ja-JP" altLang="en-US"/>
               <a:t>第 </a:t>
             </a:r>
             <a:r>
-              <a:rPr kumimoji="1" lang="en-US" altLang="ja-JP" smtClean="0"/>
+              <a:rPr kumimoji="1" lang="en-US" altLang="ja-JP"/>
               <a:t>3 </a:t>
             </a:r>
             <a:r>
-              <a:rPr kumimoji="1" lang="ja-JP" altLang="en-US" smtClean="0"/>
+              <a:rPr kumimoji="1" lang="ja-JP" altLang="en-US"/>
               <a:t>レベル</a:t>
             </a:r>
           </a:p>
           <a:p>
             <a:pPr lvl="3"/>
             <a:r>
-              <a:rPr kumimoji="1" lang="ja-JP" altLang="en-US" smtClean="0"/>
+              <a:rPr kumimoji="1" lang="ja-JP" altLang="en-US"/>
               <a:t>第 </a:t>
             </a:r>
             <a:r>
-              <a:rPr kumimoji="1" lang="en-US" altLang="ja-JP" smtClean="0"/>
+              <a:rPr kumimoji="1" lang="en-US" altLang="ja-JP"/>
               <a:t>4 </a:t>
             </a:r>
             <a:r>
-              <a:rPr kumimoji="1" lang="ja-JP" altLang="en-US" smtClean="0"/>
+              <a:rPr kumimoji="1" lang="ja-JP" altLang="en-US"/>
               <a:t>レベル</a:t>
             </a:r>
           </a:p>
           <a:p>
             <a:pPr lvl="4"/>
             <a:r>
-              <a:rPr kumimoji="1" lang="ja-JP" altLang="en-US" smtClean="0"/>
+              <a:rPr kumimoji="1" lang="ja-JP" altLang="en-US"/>
               <a:t>第 </a:t>
             </a:r>
             <a:r>
-              <a:rPr kumimoji="1" lang="en-US" altLang="ja-JP" smtClean="0"/>
+              <a:rPr kumimoji="1" lang="en-US" altLang="ja-JP"/>
               <a:t>5 </a:t>
             </a:r>
             <a:r>
-              <a:rPr kumimoji="1" lang="ja-JP" altLang="en-US" smtClean="0"/>
+              <a:rPr kumimoji="1" lang="ja-JP" altLang="en-US"/>
               <a:t>レベル</a:t>
             </a:r>
-            <a:endParaRPr kumimoji="1" lang="ja-JP" altLang="en-US"/>
           </a:p>
         </p:txBody>
       </p:sp>
@@ -2042,10 +2103,9 @@
           <a:lstStyle/>
           <a:p>
             <a:r>
-              <a:rPr kumimoji="1" lang="ja-JP" altLang="en-US" smtClean="0"/>
+              <a:rPr kumimoji="1" lang="ja-JP" altLang="en-US"/>
               <a:t>マスター タイトルの書式設定</a:t>
             </a:r>
-            <a:endParaRPr kumimoji="1" lang="ja-JP" altLang="en-US"/>
           </a:p>
         </p:txBody>
       </p:sp>
@@ -2061,8 +2121,8 @@
         </p:nvSpPr>
         <p:spPr>
           <a:xfrm>
-            <a:off x="457200" y="1000108"/>
-            <a:ext cx="4038600" cy="5429288"/>
+            <a:off x="609600" y="1000108"/>
+            <a:ext cx="5384800" cy="5429288"/>
           </a:xfrm>
         </p:spPr>
         <p:txBody>
@@ -2101,67 +2161,67 @@
           <a:p>
             <a:pPr lvl="0"/>
             <a:r>
-              <a:rPr kumimoji="1" lang="ja-JP" altLang="en-US" smtClean="0"/>
+              <a:rPr kumimoji="1" lang="ja-JP" altLang="en-US"/>
               <a:t>マスター テキストの書式設定</a:t>
             </a:r>
           </a:p>
           <a:p>
             <a:pPr lvl="1"/>
             <a:r>
-              <a:rPr kumimoji="1" lang="ja-JP" altLang="en-US" smtClean="0"/>
+              <a:rPr kumimoji="1" lang="ja-JP" altLang="en-US"/>
               <a:t>第 </a:t>
             </a:r>
             <a:r>
-              <a:rPr kumimoji="1" lang="en-US" altLang="ja-JP" smtClean="0"/>
+              <a:rPr kumimoji="1" lang="en-US" altLang="ja-JP"/>
               <a:t>2 </a:t>
             </a:r>
             <a:r>
-              <a:rPr kumimoji="1" lang="ja-JP" altLang="en-US" smtClean="0"/>
+              <a:rPr kumimoji="1" lang="ja-JP" altLang="en-US"/>
               <a:t>レベル</a:t>
             </a:r>
           </a:p>
           <a:p>
             <a:pPr lvl="2"/>
             <a:r>
-              <a:rPr kumimoji="1" lang="ja-JP" altLang="en-US" smtClean="0"/>
+              <a:rPr kumimoji="1" lang="ja-JP" altLang="en-US"/>
               <a:t>第 </a:t>
             </a:r>
             <a:r>
-              <a:rPr kumimoji="1" lang="en-US" altLang="ja-JP" smtClean="0"/>
+              <a:rPr kumimoji="1" lang="en-US" altLang="ja-JP"/>
               <a:t>3 </a:t>
             </a:r>
             <a:r>
-              <a:rPr kumimoji="1" lang="ja-JP" altLang="en-US" smtClean="0"/>
+              <a:rPr kumimoji="1" lang="ja-JP" altLang="en-US"/>
               <a:t>レベル</a:t>
             </a:r>
           </a:p>
           <a:p>
             <a:pPr lvl="3"/>
             <a:r>
-              <a:rPr kumimoji="1" lang="ja-JP" altLang="en-US" smtClean="0"/>
+              <a:rPr kumimoji="1" lang="ja-JP" altLang="en-US"/>
               <a:t>第 </a:t>
             </a:r>
             <a:r>
-              <a:rPr kumimoji="1" lang="en-US" altLang="ja-JP" smtClean="0"/>
+              <a:rPr kumimoji="1" lang="en-US" altLang="ja-JP"/>
               <a:t>4 </a:t>
             </a:r>
             <a:r>
-              <a:rPr kumimoji="1" lang="ja-JP" altLang="en-US" smtClean="0"/>
+              <a:rPr kumimoji="1" lang="ja-JP" altLang="en-US"/>
               <a:t>レベル</a:t>
             </a:r>
           </a:p>
           <a:p>
             <a:pPr lvl="4"/>
             <a:r>
-              <a:rPr kumimoji="1" lang="ja-JP" altLang="en-US" smtClean="0"/>
+              <a:rPr kumimoji="1" lang="ja-JP" altLang="en-US"/>
               <a:t>第 </a:t>
             </a:r>
             <a:r>
-              <a:rPr kumimoji="1" lang="en-US" altLang="ja-JP" smtClean="0"/>
+              <a:rPr kumimoji="1" lang="en-US" altLang="ja-JP"/>
               <a:t>5 </a:t>
             </a:r>
             <a:r>
-              <a:rPr kumimoji="1" lang="ja-JP" altLang="en-US" smtClean="0"/>
+              <a:rPr kumimoji="1" lang="ja-JP" altLang="en-US"/>
               <a:t>レベル</a:t>
             </a:r>
             <a:endParaRPr kumimoji="1" lang="ja-JP" altLang="en-US" dirty="0"/>
@@ -2180,8 +2240,8 @@
         </p:nvSpPr>
         <p:spPr>
           <a:xfrm>
-            <a:off x="4648200" y="1000108"/>
-            <a:ext cx="4038600" cy="5429288"/>
+            <a:off x="6197600" y="1000108"/>
+            <a:ext cx="5384800" cy="5429288"/>
           </a:xfrm>
         </p:spPr>
         <p:txBody>
@@ -2220,67 +2280,67 @@
           <a:p>
             <a:pPr lvl="0"/>
             <a:r>
-              <a:rPr kumimoji="1" lang="ja-JP" altLang="en-US" smtClean="0"/>
+              <a:rPr kumimoji="1" lang="ja-JP" altLang="en-US"/>
               <a:t>マスター テキストの書式設定</a:t>
             </a:r>
           </a:p>
           <a:p>
             <a:pPr lvl="1"/>
             <a:r>
-              <a:rPr kumimoji="1" lang="ja-JP" altLang="en-US" smtClean="0"/>
+              <a:rPr kumimoji="1" lang="ja-JP" altLang="en-US"/>
               <a:t>第 </a:t>
             </a:r>
             <a:r>
-              <a:rPr kumimoji="1" lang="en-US" altLang="ja-JP" smtClean="0"/>
+              <a:rPr kumimoji="1" lang="en-US" altLang="ja-JP"/>
               <a:t>2 </a:t>
             </a:r>
             <a:r>
-              <a:rPr kumimoji="1" lang="ja-JP" altLang="en-US" smtClean="0"/>
+              <a:rPr kumimoji="1" lang="ja-JP" altLang="en-US"/>
               <a:t>レベル</a:t>
             </a:r>
           </a:p>
           <a:p>
             <a:pPr lvl="2"/>
             <a:r>
-              <a:rPr kumimoji="1" lang="ja-JP" altLang="en-US" smtClean="0"/>
+              <a:rPr kumimoji="1" lang="ja-JP" altLang="en-US"/>
               <a:t>第 </a:t>
             </a:r>
             <a:r>
-              <a:rPr kumimoji="1" lang="en-US" altLang="ja-JP" smtClean="0"/>
+              <a:rPr kumimoji="1" lang="en-US" altLang="ja-JP"/>
               <a:t>3 </a:t>
             </a:r>
             <a:r>
-              <a:rPr kumimoji="1" lang="ja-JP" altLang="en-US" smtClean="0"/>
+              <a:rPr kumimoji="1" lang="ja-JP" altLang="en-US"/>
               <a:t>レベル</a:t>
             </a:r>
           </a:p>
           <a:p>
             <a:pPr lvl="3"/>
             <a:r>
-              <a:rPr kumimoji="1" lang="ja-JP" altLang="en-US" smtClean="0"/>
+              <a:rPr kumimoji="1" lang="ja-JP" altLang="en-US"/>
               <a:t>第 </a:t>
             </a:r>
             <a:r>
-              <a:rPr kumimoji="1" lang="en-US" altLang="ja-JP" smtClean="0"/>
+              <a:rPr kumimoji="1" lang="en-US" altLang="ja-JP"/>
               <a:t>4 </a:t>
             </a:r>
             <a:r>
-              <a:rPr kumimoji="1" lang="ja-JP" altLang="en-US" smtClean="0"/>
+              <a:rPr kumimoji="1" lang="ja-JP" altLang="en-US"/>
               <a:t>レベル</a:t>
             </a:r>
           </a:p>
           <a:p>
             <a:pPr lvl="4"/>
             <a:r>
-              <a:rPr kumimoji="1" lang="ja-JP" altLang="en-US" smtClean="0"/>
+              <a:rPr kumimoji="1" lang="ja-JP" altLang="en-US"/>
               <a:t>第 </a:t>
             </a:r>
             <a:r>
-              <a:rPr kumimoji="1" lang="en-US" altLang="ja-JP" smtClean="0"/>
+              <a:rPr kumimoji="1" lang="en-US" altLang="ja-JP"/>
               <a:t>5 </a:t>
             </a:r>
             <a:r>
-              <a:rPr kumimoji="1" lang="ja-JP" altLang="en-US" smtClean="0"/>
+              <a:rPr kumimoji="1" lang="ja-JP" altLang="en-US"/>
               <a:t>レベル</a:t>
             </a:r>
             <a:endParaRPr kumimoji="1" lang="ja-JP" altLang="en-US" dirty="0"/>
@@ -2328,10 +2388,9 @@
           <a:lstStyle/>
           <a:p>
             <a:r>
-              <a:rPr kumimoji="1" lang="ja-JP" altLang="en-US" smtClean="0"/>
+              <a:rPr kumimoji="1" lang="ja-JP" altLang="en-US"/>
               <a:t>マスター タイトルの書式設定</a:t>
             </a:r>
-            <a:endParaRPr kumimoji="1" lang="ja-JP" altLang="en-US"/>
           </a:p>
         </p:txBody>
       </p:sp>
@@ -2344,7 +2403,7 @@
 </file>
 
 <file path=ppt/slideLayouts/slideLayout6.xml><?xml version="1.0" encoding="utf-8"?>
-<p:sldLayout xmlns:a="http://schemas.openxmlformats.org/drawingml/2006/main" xmlns:r="http://schemas.openxmlformats.org/officeDocument/2006/relationships" xmlns:p="http://schemas.openxmlformats.org/presentationml/2006/main" type="blank" preserve="1">
+<p:sldLayout xmlns:a="http://schemas.openxmlformats.org/drawingml/2006/main" xmlns:r="http://schemas.openxmlformats.org/officeDocument/2006/relationships" xmlns:p="http://schemas.openxmlformats.org/presentationml/2006/main" showMasterSp="0" type="blank" preserve="1">
   <p:cSld name="白紙">
     <p:spTree>
       <p:nvGrpSpPr>
@@ -2368,8 +2427,230 @@
 </p:sldLayout>
 </file>
 
+<file path=ppt/slideLayouts/slideLayout7.xml><?xml version="1.0" encoding="utf-8"?>
+<p:sldLayout xmlns:a="http://schemas.openxmlformats.org/drawingml/2006/main" xmlns:r="http://schemas.openxmlformats.org/officeDocument/2006/relationships" xmlns:p="http://schemas.openxmlformats.org/presentationml/2006/main" type="obj" preserve="1">
+  <p:cSld name="無効なスライド">
+    <p:bg>
+      <p:bgPr>
+        <a:solidFill>
+          <a:schemeClr val="bg1">
+            <a:lumMod val="85000"/>
+            <a:alpha val="70000"/>
+          </a:schemeClr>
+        </a:solidFill>
+        <a:effectLst/>
+      </p:bgPr>
+    </p:bg>
+    <p:spTree>
+      <p:nvGrpSpPr>
+        <p:cNvPr id="1" name=""/>
+        <p:cNvGrpSpPr/>
+        <p:nvPr/>
+      </p:nvGrpSpPr>
+      <p:grpSpPr>
+        <a:xfrm>
+          <a:off x="0" y="0"/>
+          <a:ext cx="0" cy="0"/>
+          <a:chOff x="0" y="0"/>
+          <a:chExt cx="0" cy="0"/>
+        </a:xfrm>
+      </p:grpSpPr>
+      <p:sp>
+        <p:nvSpPr>
+          <p:cNvPr id="2" name="タイトル 1"/>
+          <p:cNvSpPr>
+            <a:spLocks noGrp="1"/>
+          </p:cNvSpPr>
+          <p:nvPr>
+            <p:ph type="title"/>
+          </p:nvPr>
+        </p:nvSpPr>
+        <p:spPr/>
+        <p:txBody>
+          <a:bodyPr/>
+          <a:lstStyle/>
+          <a:p>
+            <a:r>
+              <a:rPr kumimoji="1" lang="ja-JP" altLang="en-US"/>
+              <a:t>マスター タイトルの書式設定</a:t>
+            </a:r>
+          </a:p>
+        </p:txBody>
+      </p:sp>
+      <p:sp>
+        <p:nvSpPr>
+          <p:cNvPr id="3" name="コンテンツ プレースホルダ 2"/>
+          <p:cNvSpPr>
+            <a:spLocks noGrp="1"/>
+          </p:cNvSpPr>
+          <p:nvPr>
+            <p:ph idx="1"/>
+          </p:nvPr>
+        </p:nvSpPr>
+        <p:spPr/>
+        <p:txBody>
+          <a:bodyPr/>
+          <a:lstStyle/>
+          <a:p>
+            <a:pPr lvl="0"/>
+            <a:r>
+              <a:rPr kumimoji="1" lang="ja-JP" altLang="en-US"/>
+              <a:t>マスター テキストの書式設定</a:t>
+            </a:r>
+          </a:p>
+          <a:p>
+            <a:pPr lvl="1"/>
+            <a:r>
+              <a:rPr kumimoji="1" lang="ja-JP" altLang="en-US"/>
+              <a:t>第 </a:t>
+            </a:r>
+            <a:r>
+              <a:rPr kumimoji="1" lang="en-US" altLang="ja-JP"/>
+              <a:t>2 </a:t>
+            </a:r>
+            <a:r>
+              <a:rPr kumimoji="1" lang="ja-JP" altLang="en-US"/>
+              <a:t>レベル</a:t>
+            </a:r>
+          </a:p>
+          <a:p>
+            <a:pPr lvl="2"/>
+            <a:r>
+              <a:rPr kumimoji="1" lang="ja-JP" altLang="en-US"/>
+              <a:t>第 </a:t>
+            </a:r>
+            <a:r>
+              <a:rPr kumimoji="1" lang="en-US" altLang="ja-JP"/>
+              <a:t>3 </a:t>
+            </a:r>
+            <a:r>
+              <a:rPr kumimoji="1" lang="ja-JP" altLang="en-US"/>
+              <a:t>レベル</a:t>
+            </a:r>
+          </a:p>
+          <a:p>
+            <a:pPr lvl="3"/>
+            <a:r>
+              <a:rPr kumimoji="1" lang="ja-JP" altLang="en-US"/>
+              <a:t>第 </a:t>
+            </a:r>
+            <a:r>
+              <a:rPr kumimoji="1" lang="en-US" altLang="ja-JP"/>
+              <a:t>4 </a:t>
+            </a:r>
+            <a:r>
+              <a:rPr kumimoji="1" lang="ja-JP" altLang="en-US"/>
+              <a:t>レベル</a:t>
+            </a:r>
+          </a:p>
+          <a:p>
+            <a:pPr lvl="4"/>
+            <a:r>
+              <a:rPr kumimoji="1" lang="ja-JP" altLang="en-US"/>
+              <a:t>第 </a:t>
+            </a:r>
+            <a:r>
+              <a:rPr kumimoji="1" lang="en-US" altLang="ja-JP"/>
+              <a:t>5 </a:t>
+            </a:r>
+            <a:r>
+              <a:rPr kumimoji="1" lang="ja-JP" altLang="en-US"/>
+              <a:t>レベル</a:t>
+            </a:r>
+          </a:p>
+        </p:txBody>
+      </p:sp>
+      <p:sp>
+        <p:nvSpPr>
+          <p:cNvPr id="4" name="禁止 3">
+            <a:extLst>
+              <a:ext uri="{FF2B5EF4-FFF2-40B4-BE49-F238E27FC236}">
+                <a16:creationId xmlns:a16="http://schemas.microsoft.com/office/drawing/2014/main" id="{379D1D80-BACC-9D89-AB04-9283F5881602}"/>
+              </a:ext>
+            </a:extLst>
+          </p:cNvPr>
+          <p:cNvSpPr/>
+          <p:nvPr userDrawn="1"/>
+        </p:nvSpPr>
+        <p:spPr>
+          <a:xfrm>
+            <a:off x="9840416" y="116632"/>
+            <a:ext cx="2146250" cy="2146250"/>
+          </a:xfrm>
+          <a:prstGeom prst="noSmoking">
+            <a:avLst>
+              <a:gd name="adj" fmla="val 13494"/>
+            </a:avLst>
+          </a:prstGeom>
+          <a:solidFill>
+            <a:schemeClr val="bg1">
+              <a:lumMod val="85000"/>
+            </a:schemeClr>
+          </a:solidFill>
+          <a:ln w="28575">
+            <a:solidFill>
+              <a:schemeClr val="bg1">
+                <a:lumMod val="75000"/>
+              </a:schemeClr>
+            </a:solidFill>
+          </a:ln>
+          <a:effectLst>
+            <a:outerShdw blurRad="292383" dist="172806" dir="3060000" rotWithShape="0">
+              <a:srgbClr val="000000">
+                <a:alpha val="35000"/>
+              </a:srgbClr>
+            </a:outerShdw>
+          </a:effectLst>
+        </p:spPr>
+        <p:style>
+          <a:lnRef idx="1">
+            <a:schemeClr val="accent1"/>
+          </a:lnRef>
+          <a:fillRef idx="3">
+            <a:schemeClr val="accent1"/>
+          </a:fillRef>
+          <a:effectRef idx="2">
+            <a:schemeClr val="accent1"/>
+          </a:effectRef>
+          <a:fontRef idx="minor">
+            <a:schemeClr val="lt1"/>
+          </a:fontRef>
+        </p:style>
+        <p:txBody>
+          <a:bodyPr rtlCol="0" anchor="ctr"/>
+          <a:lstStyle/>
+          <a:p>
+            <a:pPr marL="342900" indent="-342900" algn="ctr">
+              <a:buFont typeface="+mj-lt"/>
+              <a:buAutoNum type="arabicPeriod"/>
+            </a:pPr>
+            <a:endParaRPr kumimoji="1" lang="ja-JP" altLang="en-US" sz="1200" dirty="0">
+              <a:solidFill>
+                <a:schemeClr val="tx1">
+                  <a:lumMod val="50000"/>
+                  <a:lumOff val="50000"/>
+                </a:schemeClr>
+              </a:solidFill>
+              <a:ea typeface="ヒラギノ丸ゴ ProN W4"/>
+            </a:endParaRPr>
+          </a:p>
+        </p:txBody>
+      </p:sp>
+    </p:spTree>
+    <p:extLst>
+      <p:ext uri="{BB962C8B-B14F-4D97-AF65-F5344CB8AC3E}">
+        <p14:creationId xmlns:p14="http://schemas.microsoft.com/office/powerpoint/2010/main" val="2784835071"/>
+      </p:ext>
+    </p:extLst>
+  </p:cSld>
+  <p:clrMapOvr>
+    <a:masterClrMapping/>
+  </p:clrMapOvr>
+</p:sldLayout>
+</file>
+
 <file path=ppt/slideMasters/slideMaster1.xml><?xml version="1.0" encoding="utf-8"?>
-<p:sldMaster xmlns:a="http://schemas.openxmlformats.org/drawingml/2006/main" xmlns:r="http://schemas.openxmlformats.org/officeDocument/2006/relationships" xmlns:p="http://schemas.openxmlformats.org/presentationml/2006/main" preserve="1">
+<p:sldMaster xmlns:a="http://schemas.openxmlformats.org/drawingml/2006/main" xmlns:r="http://schemas.openxmlformats.org/officeDocument/2006/relationships" xmlns:p="http://schemas.openxmlformats.org/presentationml/2006/main">
   <p:cSld>
     <p:bg>
       <p:bgPr>
@@ -2405,8 +2686,8 @@
         </p:nvSpPr>
         <p:spPr>
           <a:xfrm>
-            <a:off x="457200" y="274638"/>
-            <a:ext cx="8229600" cy="511156"/>
+            <a:off x="609600" y="274638"/>
+            <a:ext cx="10972800" cy="511156"/>
           </a:xfrm>
           <a:prstGeom prst="rect">
             <a:avLst/>
@@ -2419,10 +2700,9 @@
           <a:lstStyle/>
           <a:p>
             <a:r>
-              <a:rPr kumimoji="1" lang="ja-JP" altLang="en-US" dirty="0" smtClean="0"/>
+              <a:rPr kumimoji="1" lang="ja-JP" altLang="en-US" dirty="0"/>
               <a:t>マスタ タイトルの書式設定</a:t>
             </a:r>
-            <a:endParaRPr kumimoji="1" lang="ja-JP" altLang="en-US" dirty="0"/>
           </a:p>
         </p:txBody>
       </p:sp>
@@ -2438,8 +2718,8 @@
         </p:nvSpPr>
         <p:spPr>
           <a:xfrm>
-            <a:off x="457200" y="1000108"/>
-            <a:ext cx="8229600" cy="5500726"/>
+            <a:off x="609600" y="1000108"/>
+            <a:ext cx="10972800" cy="5500726"/>
           </a:xfrm>
           <a:prstGeom prst="rect">
             <a:avLst/>
@@ -2453,70 +2733,69 @@
           <a:p>
             <a:pPr lvl="0"/>
             <a:r>
-              <a:rPr kumimoji="1" lang="ja-JP" altLang="en-US" dirty="0" smtClean="0"/>
+              <a:rPr kumimoji="1" lang="ja-JP" altLang="en-US" dirty="0"/>
               <a:t>マスタ テキストの書式設定</a:t>
             </a:r>
           </a:p>
           <a:p>
             <a:pPr lvl="1"/>
             <a:r>
-              <a:rPr kumimoji="1" lang="ja-JP" altLang="en-US" dirty="0" smtClean="0"/>
+              <a:rPr kumimoji="1" lang="ja-JP" altLang="en-US" dirty="0"/>
               <a:t>第 </a:t>
             </a:r>
             <a:r>
-              <a:rPr kumimoji="1" lang="en-US" altLang="ja-JP" dirty="0" smtClean="0"/>
+              <a:rPr kumimoji="1" lang="en-US" altLang="ja-JP" dirty="0"/>
               <a:t>2 </a:t>
             </a:r>
             <a:r>
-              <a:rPr kumimoji="1" lang="ja-JP" altLang="en-US" dirty="0" smtClean="0"/>
+              <a:rPr kumimoji="1" lang="ja-JP" altLang="en-US" dirty="0"/>
               <a:t>レベル</a:t>
             </a:r>
           </a:p>
           <a:p>
             <a:pPr lvl="2"/>
             <a:r>
-              <a:rPr kumimoji="1" lang="ja-JP" altLang="en-US" dirty="0" smtClean="0"/>
+              <a:rPr kumimoji="1" lang="ja-JP" altLang="en-US" dirty="0"/>
               <a:t>第 </a:t>
             </a:r>
             <a:r>
-              <a:rPr kumimoji="1" lang="en-US" altLang="ja-JP" dirty="0" smtClean="0"/>
+              <a:rPr kumimoji="1" lang="en-US" altLang="ja-JP" dirty="0"/>
               <a:t>3 </a:t>
             </a:r>
             <a:r>
-              <a:rPr kumimoji="1" lang="ja-JP" altLang="en-US" dirty="0" smtClean="0"/>
+              <a:rPr kumimoji="1" lang="ja-JP" altLang="en-US" dirty="0"/>
               <a:t>レベル</a:t>
             </a:r>
           </a:p>
           <a:p>
             <a:pPr lvl="3"/>
             <a:r>
-              <a:rPr kumimoji="1" lang="ja-JP" altLang="en-US" dirty="0" smtClean="0"/>
+              <a:rPr kumimoji="1" lang="ja-JP" altLang="en-US" dirty="0"/>
               <a:t>第 </a:t>
             </a:r>
             <a:r>
-              <a:rPr kumimoji="1" lang="en-US" altLang="ja-JP" dirty="0" smtClean="0"/>
+              <a:rPr kumimoji="1" lang="en-US" altLang="ja-JP" dirty="0"/>
               <a:t>4 </a:t>
             </a:r>
             <a:r>
-              <a:rPr kumimoji="1" lang="ja-JP" altLang="en-US" dirty="0" smtClean="0"/>
+              <a:rPr kumimoji="1" lang="ja-JP" altLang="en-US" dirty="0"/>
               <a:t>レベル</a:t>
             </a:r>
           </a:p>
           <a:p>
             <a:pPr lvl="4"/>
             <a:r>
-              <a:rPr kumimoji="1" lang="ja-JP" altLang="en-US" dirty="0" smtClean="0"/>
+              <a:rPr kumimoji="1" lang="ja-JP" altLang="en-US" dirty="0"/>
               <a:t>第 </a:t>
             </a:r>
             <a:r>
-              <a:rPr kumimoji="1" lang="en-US" altLang="ja-JP" dirty="0" smtClean="0"/>
+              <a:rPr kumimoji="1" lang="en-US" altLang="ja-JP" dirty="0"/>
               <a:t>5 </a:t>
             </a:r>
             <a:r>
-              <a:rPr kumimoji="1" lang="ja-JP" altLang="en-US" dirty="0" smtClean="0"/>
+              <a:rPr kumimoji="1" lang="ja-JP" altLang="en-US" dirty="0"/>
               <a:t>レベル</a:t>
             </a:r>
-            <a:endParaRPr kumimoji="1" lang="ja-JP" altLang="en-US" dirty="0"/>
           </a:p>
         </p:txBody>
       </p:sp>
@@ -2528,8 +2807,8 @@
         </p:nvCxnSpPr>
         <p:spPr>
           <a:xfrm>
-            <a:off x="500034" y="785794"/>
-            <a:ext cx="8215370" cy="1588"/>
+            <a:off x="666713" y="785794"/>
+            <a:ext cx="10953827" cy="1588"/>
           </a:xfrm>
           <a:prstGeom prst="line">
             <a:avLst/>
@@ -2571,21 +2850,33 @@
       </p:cxnSp>
       <p:grpSp>
         <p:nvGrpSpPr>
-          <p:cNvPr id="4" name="図形グループ 3"/>
+          <p:cNvPr id="15" name="グループ化 14">
+            <a:extLst>
+              <a:ext uri="{FF2B5EF4-FFF2-40B4-BE49-F238E27FC236}">
+                <a16:creationId xmlns:a16="http://schemas.microsoft.com/office/drawing/2014/main" id="{C9AB4473-6789-254C-A2CF-3F1DD2017B9F}"/>
+              </a:ext>
+            </a:extLst>
+          </p:cNvPr>
           <p:cNvGrpSpPr/>
           <p:nvPr userDrawn="1"/>
         </p:nvGrpSpPr>
         <p:grpSpPr>
           <a:xfrm>
-            <a:off x="6172200" y="5181600"/>
+            <a:off x="9120336" y="4941168"/>
             <a:ext cx="2676990" cy="1229878"/>
-            <a:chOff x="6172200" y="5181600"/>
+            <a:chOff x="9120336" y="4941168"/>
             <a:chExt cx="2676990" cy="1229878"/>
           </a:xfrm>
         </p:grpSpPr>
         <p:sp>
           <p:nvSpPr>
-            <p:cNvPr id="8" name="Rectangle 8"/>
+            <p:cNvPr id="17" name="Rectangle 8">
+              <a:extLst>
+                <a:ext uri="{FF2B5EF4-FFF2-40B4-BE49-F238E27FC236}">
+                  <a16:creationId xmlns:a16="http://schemas.microsoft.com/office/drawing/2014/main" id="{2FC016E2-0CEF-FA42-B456-7E0D805D4AB4}"/>
+                </a:ext>
+              </a:extLst>
+            </p:cNvPr>
             <p:cNvSpPr>
               <a:spLocks noChangeArrowheads="1"/>
             </p:cNvSpPr>
@@ -2593,7 +2884,7 @@
           </p:nvSpPr>
           <p:spPr bwMode="auto">
             <a:xfrm rot="20400000">
-              <a:off x="6172200" y="5822009"/>
+              <a:off x="9120336" y="5581577"/>
               <a:ext cx="540000" cy="540000"/>
             </a:xfrm>
             <a:prstGeom prst="rect">
@@ -2604,10 +2895,73 @@
               <a:gradFill flip="none" rotWithShape="1">
                 <a:gsLst>
                   <a:gs pos="0">
-                    <a:srgbClr val="F7B5B0"/>
+                    <a:srgbClr val="FF0000">
+                      <a:alpha val="10000"/>
+                    </a:srgbClr>
                   </a:gs>
                   <a:gs pos="100000">
-                    <a:srgbClr val="F7B5B0">
+                    <a:srgbClr val="FF0000">
+                      <a:alpha val="10000"/>
+                    </a:srgbClr>
+                  </a:gs>
+                </a:gsLst>
+                <a:lin ang="0" scaled="1"/>
+                <a:tileRect/>
+              </a:gradFill>
+              <a:miter lim="800000"/>
+              <a:headEnd/>
+              <a:tailEnd/>
+            </a:ln>
+            <a:effectLst>
+              <a:reflection stA="50000" endPos="75000" dist="12700" dir="5400000" sy="-100000" algn="bl" rotWithShape="0"/>
+            </a:effectLst>
+          </p:spPr>
+          <p:txBody>
+            <a:bodyPr wrap="none" anchor="ctr"/>
+            <a:lstStyle/>
+            <a:p>
+              <a:pPr>
+                <a:defRPr/>
+              </a:pPr>
+              <a:endParaRPr lang="ja-JP" altLang="en-US" sz="1800" dirty="0">
+                <a:ea typeface="ヒラギノ丸ゴ Pro W4"/>
+              </a:endParaRPr>
+            </a:p>
+          </p:txBody>
+        </p:sp>
+        <p:sp>
+          <p:nvSpPr>
+            <p:cNvPr id="18" name="Rectangle 8">
+              <a:extLst>
+                <a:ext uri="{FF2B5EF4-FFF2-40B4-BE49-F238E27FC236}">
+                  <a16:creationId xmlns:a16="http://schemas.microsoft.com/office/drawing/2014/main" id="{5D145A28-9296-1B43-B613-8AD34C3A2D28}"/>
+                </a:ext>
+              </a:extLst>
+            </p:cNvPr>
+            <p:cNvSpPr>
+              <a:spLocks noChangeArrowheads="1"/>
+            </p:cNvSpPr>
+            <p:nvPr userDrawn="1"/>
+          </p:nvSpPr>
+          <p:spPr bwMode="auto">
+            <a:xfrm rot="21300000">
+              <a:off x="9609248" y="5271046"/>
+              <a:ext cx="900000" cy="900000"/>
+            </a:xfrm>
+            <a:prstGeom prst="rect">
+              <a:avLst/>
+            </a:prstGeom>
+            <a:noFill/>
+            <a:ln w="76200">
+              <a:gradFill flip="none" rotWithShape="1">
+                <a:gsLst>
+                  <a:gs pos="0">
+                    <a:srgbClr val="FFFF00">
+                      <a:alpha val="50000"/>
+                    </a:srgbClr>
+                  </a:gs>
+                  <a:gs pos="100000">
+                    <a:srgbClr val="FFFF00">
                       <a:alpha val="25000"/>
                     </a:srgbClr>
                   </a:gs>
@@ -2630,7 +2984,7 @@
               <a:pPr>
                 <a:defRPr/>
               </a:pPr>
-              <a:endParaRPr lang="ja-JP" altLang="en-US" dirty="0">
+              <a:endParaRPr lang="ja-JP" altLang="en-US" sz="1800" dirty="0">
                 <a:ea typeface="ヒラギノ丸ゴ Pro W4"/>
               </a:endParaRPr>
             </a:p>
@@ -2638,16 +2992,22 @@
         </p:sp>
         <p:sp>
           <p:nvSpPr>
-            <p:cNvPr id="15" name="Rectangle 8"/>
+            <p:cNvPr id="19" name="Rectangle 8">
+              <a:extLst>
+                <a:ext uri="{FF2B5EF4-FFF2-40B4-BE49-F238E27FC236}">
+                  <a16:creationId xmlns:a16="http://schemas.microsoft.com/office/drawing/2014/main" id="{4D7593AD-299C-0041-A868-D4ABE1D870FF}"/>
+                </a:ext>
+              </a:extLst>
+            </p:cNvPr>
             <p:cNvSpPr>
               <a:spLocks noChangeArrowheads="1"/>
             </p:cNvSpPr>
             <p:nvPr userDrawn="1"/>
           </p:nvSpPr>
           <p:spPr bwMode="auto">
-            <a:xfrm rot="21300000">
-              <a:off x="6661112" y="5511478"/>
-              <a:ext cx="900000" cy="900000"/>
+            <a:xfrm rot="600000">
+              <a:off x="10160771" y="5126750"/>
+              <a:ext cx="990000" cy="990000"/>
             </a:xfrm>
             <a:prstGeom prst="rect">
               <a:avLst/>
@@ -2657,13 +3017,13 @@
               <a:gradFill flip="none" rotWithShape="1">
                 <a:gsLst>
                   <a:gs pos="0">
-                    <a:srgbClr val="FFFF00">
-                      <a:alpha val="50000"/>
+                    <a:srgbClr val="008000">
+                      <a:alpha val="10000"/>
                     </a:srgbClr>
                   </a:gs>
-                  <a:gs pos="100000">
-                    <a:srgbClr val="F9F88E">
-                      <a:alpha val="15000"/>
+                  <a:gs pos="99000">
+                    <a:srgbClr val="008000">
+                      <a:alpha val="5000"/>
                     </a:srgbClr>
                   </a:gs>
                 </a:gsLst>
@@ -2685,7 +3045,7 @@
               <a:pPr>
                 <a:defRPr/>
               </a:pPr>
-              <a:endParaRPr lang="ja-JP" altLang="en-US" dirty="0">
+              <a:endParaRPr lang="ja-JP" altLang="en-US" sz="1800" dirty="0">
                 <a:ea typeface="ヒラギノ丸ゴ Pro W4"/>
               </a:endParaRPr>
             </a:p>
@@ -2693,16 +3053,22 @@
         </p:sp>
         <p:sp>
           <p:nvSpPr>
-            <p:cNvPr id="18" name="Rectangle 8"/>
+            <p:cNvPr id="20" name="Rectangle 8">
+              <a:extLst>
+                <a:ext uri="{FF2B5EF4-FFF2-40B4-BE49-F238E27FC236}">
+                  <a16:creationId xmlns:a16="http://schemas.microsoft.com/office/drawing/2014/main" id="{713CE57C-761A-F343-BF46-B397C3313D93}"/>
+                </a:ext>
+              </a:extLst>
+            </p:cNvPr>
             <p:cNvSpPr>
               <a:spLocks noChangeArrowheads="1"/>
             </p:cNvSpPr>
             <p:nvPr userDrawn="1"/>
           </p:nvSpPr>
           <p:spPr bwMode="auto">
-            <a:xfrm rot="600000">
-              <a:off x="7212635" y="5367182"/>
-              <a:ext cx="990000" cy="990000"/>
+            <a:xfrm rot="1800000">
+              <a:off x="10717326" y="4941168"/>
+              <a:ext cx="1080000" cy="1080000"/>
             </a:xfrm>
             <a:prstGeom prst="rect">
               <a:avLst/>
@@ -2712,11 +3078,13 @@
               <a:gradFill flip="none" rotWithShape="1">
                 <a:gsLst>
                   <a:gs pos="0">
-                    <a:srgbClr val="A3E6A5"/>
+                    <a:srgbClr val="0000FF">
+                      <a:alpha val="10000"/>
+                    </a:srgbClr>
                   </a:gs>
                   <a:gs pos="100000">
-                    <a:srgbClr val="ACCFAD">
-                      <a:alpha val="15000"/>
+                    <a:srgbClr val="0000FF">
+                      <a:alpha val="5000"/>
                     </a:srgbClr>
                   </a:gs>
                 </a:gsLst>
@@ -2738,60 +3106,7 @@
               <a:pPr>
                 <a:defRPr/>
               </a:pPr>
-              <a:endParaRPr lang="ja-JP" altLang="en-US" dirty="0">
-                <a:ea typeface="ヒラギノ丸ゴ Pro W4"/>
-              </a:endParaRPr>
-            </a:p>
-          </p:txBody>
-        </p:sp>
-        <p:sp>
-          <p:nvSpPr>
-            <p:cNvPr id="19" name="Rectangle 8"/>
-            <p:cNvSpPr>
-              <a:spLocks noChangeArrowheads="1"/>
-            </p:cNvSpPr>
-            <p:nvPr userDrawn="1"/>
-          </p:nvSpPr>
-          <p:spPr bwMode="auto">
-            <a:xfrm rot="1800000">
-              <a:off x="7769190" y="5181600"/>
-              <a:ext cx="1080000" cy="1080000"/>
-            </a:xfrm>
-            <a:prstGeom prst="rect">
-              <a:avLst/>
-            </a:prstGeom>
-            <a:noFill/>
-            <a:ln w="76200">
-              <a:gradFill flip="none" rotWithShape="1">
-                <a:gsLst>
-                  <a:gs pos="0">
-                    <a:srgbClr val="AEBAF7"/>
-                  </a:gs>
-                  <a:gs pos="100000">
-                    <a:srgbClr val="AEBAF7">
-                      <a:alpha val="15000"/>
-                    </a:srgbClr>
-                  </a:gs>
-                </a:gsLst>
-                <a:lin ang="0" scaled="1"/>
-                <a:tileRect/>
-              </a:gradFill>
-              <a:miter lim="800000"/>
-              <a:headEnd/>
-              <a:tailEnd/>
-            </a:ln>
-            <a:effectLst>
-              <a:reflection stA="50000" endPos="75000" dist="12700" dir="5400000" sy="-100000" algn="bl" rotWithShape="0"/>
-            </a:effectLst>
-          </p:spPr>
-          <p:txBody>
-            <a:bodyPr wrap="none" anchor="ctr"/>
-            <a:lstStyle/>
-            <a:p>
-              <a:pPr>
-                <a:defRPr/>
-              </a:pPr>
-              <a:endParaRPr lang="ja-JP" altLang="en-US" dirty="0">
+              <a:endParaRPr lang="ja-JP" altLang="en-US" sz="1800" dirty="0">
                 <a:ea typeface="ヒラギノ丸ゴ Pro W4"/>
               </a:endParaRPr>
             </a:p>
@@ -2808,14 +3123,8 @@
     <p:sldLayoutId id="2147483652" r:id="rId4"/>
     <p:sldLayoutId id="2147483654" r:id="rId5"/>
     <p:sldLayoutId id="2147483655" r:id="rId6"/>
+    <p:sldLayoutId id="2147483663" r:id="rId7"/>
   </p:sldLayoutIdLst>
-  <p:timing>
-    <p:tnLst>
-      <p:par>
-        <p:cTn id="1" dur="indefinite" restart="never" nodeType="tmRoot"/>
-      </p:par>
-    </p:tnLst>
-  </p:timing>
   <p:txStyles>
     <p:titleStyle>
       <a:lvl1pPr algn="l" defTabSz="914400" rtl="0" eaLnBrk="1" latinLnBrk="0" hangingPunct="1">
@@ -3104,8 +3413,8 @@
           <a:lstStyle/>
           <a:p>
             <a:r>
-              <a:rPr kumimoji="1" lang="ja-JP" altLang="en-US" dirty="0" smtClean="0"/>
-              <a:t>演題のタイトル</a:t>
+              <a:rPr lang="ja-JP" altLang="en-US"/>
+              <a:t>すばらしいタイトル</a:t>
             </a:r>
             <a:endParaRPr kumimoji="1" lang="ja-JP" altLang="en-US" dirty="0"/>
           </a:p>
@@ -3127,263 +3436,9 @@
           <a:lstStyle/>
           <a:p>
             <a:r>
-              <a:rPr kumimoji="1" lang="ja-JP" altLang="en-US" dirty="0" smtClean="0"/>
-              <a:t>演者名</a:t>
-            </a:r>
-            <a:endParaRPr kumimoji="1" lang="ja-JP" altLang="en-US" dirty="0"/>
-          </a:p>
-        </p:txBody>
-      </p:sp>
-      <p:sp>
-        <p:nvSpPr>
-          <p:cNvPr id="4" name="サブタイトル 4"/>
-          <p:cNvSpPr txBox="1">
-            <a:spLocks/>
-          </p:cNvSpPr>
-          <p:nvPr/>
-        </p:nvSpPr>
-        <p:spPr>
-          <a:xfrm>
-            <a:off x="414340" y="5805264"/>
-            <a:ext cx="5214920" cy="864096"/>
-          </a:xfrm>
-          <a:prstGeom prst="rect">
-            <a:avLst/>
-          </a:prstGeom>
-        </p:spPr>
-        <p:txBody>
-          <a:bodyPr vert="horz" lIns="91440" tIns="45720" rIns="91440" bIns="45720" rtlCol="0">
-            <a:normAutofit/>
-          </a:bodyPr>
-          <a:lstStyle>
-            <a:lvl1pPr marL="0" indent="0" algn="r" defTabSz="914400" rtl="0" eaLnBrk="1" latinLnBrk="0" hangingPunct="1">
-              <a:spcBef>
-                <a:spcPct val="20000"/>
-              </a:spcBef>
-              <a:buFont typeface="Wingdings" charset="2"/>
-              <a:buNone/>
-              <a:defRPr kumimoji="1" sz="2000" kern="1200">
-                <a:solidFill>
-                  <a:schemeClr val="tx1">
-                    <a:lumMod val="50000"/>
-                    <a:lumOff val="50000"/>
-                  </a:schemeClr>
-                </a:solidFill>
-                <a:latin typeface="+mn-lt"/>
-                <a:ea typeface="ヒラギノ丸ゴ Pro W4"/>
-                <a:cs typeface="+mn-cs"/>
-              </a:defRPr>
-            </a:lvl1pPr>
-            <a:lvl2pPr marL="457200" indent="0" algn="ctr" defTabSz="914400" rtl="0" eaLnBrk="1" latinLnBrk="0" hangingPunct="1">
-              <a:spcBef>
-                <a:spcPct val="20000"/>
-              </a:spcBef>
-              <a:buClrTx/>
-              <a:buSzPct val="60000"/>
-              <a:buFont typeface="Wingdings" charset="2"/>
-              <a:buNone/>
-              <a:defRPr kumimoji="1" sz="2400" kern="1200">
-                <a:solidFill>
-                  <a:schemeClr val="tx1">
-                    <a:tint val="75000"/>
-                  </a:schemeClr>
-                </a:solidFill>
-                <a:latin typeface="+mn-lt"/>
-                <a:ea typeface="ヒラギノ丸ゴ Pro W4"/>
-                <a:cs typeface="+mn-cs"/>
-              </a:defRPr>
-            </a:lvl2pPr>
-            <a:lvl3pPr marL="914400" indent="0" algn="ctr" defTabSz="914400" rtl="0" eaLnBrk="1" latinLnBrk="0" hangingPunct="1">
-              <a:spcBef>
-                <a:spcPct val="20000"/>
-              </a:spcBef>
-              <a:buFont typeface="Arial" pitchFamily="34" charset="0"/>
-              <a:buNone/>
-              <a:defRPr kumimoji="1" sz="2000" kern="1200">
-                <a:solidFill>
-                  <a:schemeClr val="tx1">
-                    <a:tint val="75000"/>
-                  </a:schemeClr>
-                </a:solidFill>
-                <a:latin typeface="+mn-lt"/>
-                <a:ea typeface="ヒラギノ丸ゴ Pro W4"/>
-                <a:cs typeface="+mn-cs"/>
-              </a:defRPr>
-            </a:lvl3pPr>
-            <a:lvl4pPr marL="1371600" indent="0" algn="ctr" defTabSz="914400" rtl="0" eaLnBrk="1" latinLnBrk="0" hangingPunct="1">
-              <a:spcBef>
-                <a:spcPct val="20000"/>
-              </a:spcBef>
-              <a:buFont typeface="Wingdings" charset="2"/>
-              <a:buNone/>
-              <a:defRPr kumimoji="1" sz="1800" kern="1200">
-                <a:solidFill>
-                  <a:schemeClr val="tx1">
-                    <a:tint val="75000"/>
-                  </a:schemeClr>
-                </a:solidFill>
-                <a:latin typeface="+mn-lt"/>
-                <a:ea typeface="ヒラギノ丸ゴ Pro W4"/>
-                <a:cs typeface="+mn-cs"/>
-              </a:defRPr>
-            </a:lvl4pPr>
-            <a:lvl5pPr marL="1828800" indent="0" algn="ctr" defTabSz="914400" rtl="0" eaLnBrk="1" latinLnBrk="0" hangingPunct="1">
-              <a:spcBef>
-                <a:spcPct val="20000"/>
-              </a:spcBef>
-              <a:buFont typeface="Arial" pitchFamily="34" charset="0"/>
-              <a:buNone/>
-              <a:defRPr kumimoji="1" sz="1800" kern="1200">
-                <a:solidFill>
-                  <a:schemeClr val="tx1">
-                    <a:tint val="75000"/>
-                  </a:schemeClr>
-                </a:solidFill>
-                <a:latin typeface="+mn-lt"/>
-                <a:ea typeface="ヒラギノ丸ゴ Pro W4"/>
-                <a:cs typeface="+mn-cs"/>
-              </a:defRPr>
-            </a:lvl5pPr>
-            <a:lvl6pPr marL="2286000" indent="0" algn="ctr" defTabSz="914400" rtl="0" eaLnBrk="1" latinLnBrk="0" hangingPunct="1">
-              <a:spcBef>
-                <a:spcPct val="20000"/>
-              </a:spcBef>
-              <a:buFont typeface="Arial" pitchFamily="34" charset="0"/>
-              <a:buNone/>
-              <a:defRPr kumimoji="1" sz="2000" kern="1200">
-                <a:solidFill>
-                  <a:schemeClr val="tx1">
-                    <a:tint val="75000"/>
-                  </a:schemeClr>
-                </a:solidFill>
-                <a:latin typeface="+mn-lt"/>
-                <a:ea typeface="+mn-ea"/>
-                <a:cs typeface="+mn-cs"/>
-              </a:defRPr>
-            </a:lvl6pPr>
-            <a:lvl7pPr marL="2743200" indent="0" algn="ctr" defTabSz="914400" rtl="0" eaLnBrk="1" latinLnBrk="0" hangingPunct="1">
-              <a:spcBef>
-                <a:spcPct val="20000"/>
-              </a:spcBef>
-              <a:buFont typeface="Arial" pitchFamily="34" charset="0"/>
-              <a:buNone/>
-              <a:defRPr kumimoji="1" sz="2000" kern="1200">
-                <a:solidFill>
-                  <a:schemeClr val="tx1">
-                    <a:tint val="75000"/>
-                  </a:schemeClr>
-                </a:solidFill>
-                <a:latin typeface="+mn-lt"/>
-                <a:ea typeface="+mn-ea"/>
-                <a:cs typeface="+mn-cs"/>
-              </a:defRPr>
-            </a:lvl7pPr>
-            <a:lvl8pPr marL="3200400" indent="0" algn="ctr" defTabSz="914400" rtl="0" eaLnBrk="1" latinLnBrk="0" hangingPunct="1">
-              <a:spcBef>
-                <a:spcPct val="20000"/>
-              </a:spcBef>
-              <a:buFont typeface="Arial" pitchFamily="34" charset="0"/>
-              <a:buNone/>
-              <a:defRPr kumimoji="1" sz="2000" kern="1200">
-                <a:solidFill>
-                  <a:schemeClr val="tx1">
-                    <a:tint val="75000"/>
-                  </a:schemeClr>
-                </a:solidFill>
-                <a:latin typeface="+mn-lt"/>
-                <a:ea typeface="+mn-ea"/>
-                <a:cs typeface="+mn-cs"/>
-              </a:defRPr>
-            </a:lvl8pPr>
-            <a:lvl9pPr marL="3657600" indent="0" algn="ctr" defTabSz="914400" rtl="0" eaLnBrk="1" latinLnBrk="0" hangingPunct="1">
-              <a:spcBef>
-                <a:spcPct val="20000"/>
-              </a:spcBef>
-              <a:buFont typeface="Arial" pitchFamily="34" charset="0"/>
-              <a:buNone/>
-              <a:defRPr kumimoji="1" sz="2000" kern="1200">
-                <a:solidFill>
-                  <a:schemeClr val="tx1">
-                    <a:tint val="75000"/>
-                  </a:schemeClr>
-                </a:solidFill>
-                <a:latin typeface="+mn-lt"/>
-                <a:ea typeface="+mn-ea"/>
-                <a:cs typeface="+mn-cs"/>
-              </a:defRPr>
-            </a:lvl9pPr>
-          </a:lstStyle>
-          <a:p>
-            <a:pPr algn="l"/>
-            <a:r>
-              <a:rPr lang="ja-JP" altLang="en-US" sz="1200" dirty="0" smtClean="0"/>
-              <a:t>第</a:t>
-            </a:r>
-            <a:r>
-              <a:rPr lang="en-US" altLang="ja-JP" sz="1200" dirty="0" smtClean="0"/>
-              <a:t>XXXX</a:t>
-            </a:r>
-            <a:r>
-              <a:rPr lang="ja-JP" altLang="en-US" sz="1200" dirty="0" smtClean="0"/>
-              <a:t>回</a:t>
-            </a:r>
-            <a:r>
-              <a:rPr lang="en-US" altLang="ja-JP" sz="1200" dirty="0" smtClean="0"/>
-              <a:t> </a:t>
-            </a:r>
-            <a:r>
-              <a:rPr lang="ja-JP" altLang="en-US" sz="1200" dirty="0" smtClean="0"/>
-              <a:t>日本</a:t>
-            </a:r>
-            <a:r>
-              <a:rPr lang="en-US" altLang="ja-JP" sz="1200" dirty="0" smtClean="0"/>
-              <a:t>XXXX</a:t>
-            </a:r>
-            <a:r>
-              <a:rPr lang="ja-JP" altLang="en-US" sz="1200" dirty="0" smtClean="0"/>
-              <a:t>学会</a:t>
-            </a:r>
-            <a:r>
-              <a:rPr lang="en-US" altLang="ja-JP" sz="1200" dirty="0" smtClean="0"/>
-              <a:t>, XXXX</a:t>
-            </a:r>
-            <a:r>
-              <a:rPr lang="ja-JP" altLang="en-US" sz="1200" dirty="0" smtClean="0"/>
-              <a:t>国際フォーラム</a:t>
-            </a:r>
-            <a:endParaRPr lang="en-US" altLang="ja-JP" sz="1200" dirty="0" smtClean="0"/>
-          </a:p>
-          <a:p>
-            <a:pPr algn="l"/>
-            <a:r>
-              <a:rPr lang="ja-JP" altLang="en-US" sz="1200" dirty="0" smtClean="0"/>
-              <a:t>平成</a:t>
-            </a:r>
-            <a:r>
-              <a:rPr lang="en-US" altLang="ja-JP" sz="1200" dirty="0" smtClean="0"/>
-              <a:t>XX</a:t>
-            </a:r>
-            <a:r>
-              <a:rPr lang="ja-JP" altLang="en-US" sz="1200" dirty="0" smtClean="0"/>
-              <a:t>年</a:t>
-            </a:r>
-            <a:r>
-              <a:rPr lang="en-US" altLang="ja-JP" sz="1200" dirty="0" smtClean="0"/>
-              <a:t>X</a:t>
-            </a:r>
-            <a:r>
-              <a:rPr lang="ja-JP" altLang="en-US" sz="1200" dirty="0" smtClean="0"/>
-              <a:t>月</a:t>
-            </a:r>
-            <a:r>
-              <a:rPr lang="en-US" altLang="ja-JP" sz="1200" dirty="0" smtClean="0"/>
-              <a:t>XX</a:t>
-            </a:r>
-            <a:r>
-              <a:rPr lang="ja-JP" altLang="en-US" sz="1200" dirty="0" smtClean="0"/>
-              <a:t>日</a:t>
-            </a:r>
-            <a:endParaRPr lang="ja-JP" altLang="en-US" sz="1200" dirty="0"/>
+              <a:rPr kumimoji="1" lang="ja-JP" altLang="en-US"/>
+              <a:t>すばらしい副題</a:t>
+            </a:r>
           </a:p>
         </p:txBody>
       </p:sp>
@@ -3397,13 +3452,6 @@
   <p:clrMapOvr>
     <a:masterClrMapping/>
   </p:clrMapOvr>
-  <p:timing>
-    <p:tnLst>
-      <p:par>
-        <p:cTn id="1" dur="indefinite" restart="never" nodeType="tmRoot"/>
-      </p:par>
-    </p:tnLst>
-  </p:timing>
 </p:sld>
 </file>
 
@@ -3439,6 +3487,10 @@
           <a:bodyPr/>
           <a:lstStyle/>
           <a:p>
+            <a:r>
+              <a:rPr kumimoji="1" lang="ja-JP" altLang="en-US"/>
+              <a:t>すばらしい副題</a:t>
+            </a:r>
             <a:endParaRPr kumimoji="1" lang="ja-JP" altLang="en-US" dirty="0"/>
           </a:p>
         </p:txBody>
@@ -3446,20 +3498,13 @@
     </p:spTree>
     <p:extLst>
       <p:ext uri="{BB962C8B-B14F-4D97-AF65-F5344CB8AC3E}">
-        <p14:creationId xmlns:p14="http://schemas.microsoft.com/office/powerpoint/2010/main" val="1071604676"/>
+        <p14:creationId xmlns:p14="http://schemas.microsoft.com/office/powerpoint/2010/main" val="103403782"/>
       </p:ext>
     </p:extLst>
   </p:cSld>
   <p:clrMapOvr>
     <a:masterClrMapping/>
   </p:clrMapOvr>
-  <p:timing>
-    <p:tnLst>
-      <p:par>
-        <p:cTn id="1" dur="indefinite" restart="never" nodeType="tmRoot"/>
-      </p:par>
-    </p:tnLst>
-  </p:timing>
 </p:sld>
 </file>
 
@@ -3495,7 +3540,10 @@
           <a:bodyPr/>
           <a:lstStyle/>
           <a:p>
-            <a:endParaRPr kumimoji="1" lang="ja-JP" altLang="en-US"/>
+            <a:r>
+              <a:rPr kumimoji="1" lang="ja-JP" altLang="en-US"/>
+              <a:t>すばらしいスライド</a:t>
+            </a:r>
           </a:p>
         </p:txBody>
       </p:sp>
@@ -3521,20 +3569,13 @@
     </p:spTree>
     <p:extLst>
       <p:ext uri="{BB962C8B-B14F-4D97-AF65-F5344CB8AC3E}">
-        <p14:creationId xmlns:p14="http://schemas.microsoft.com/office/powerpoint/2010/main" val="1661925790"/>
+        <p14:creationId xmlns:p14="http://schemas.microsoft.com/office/powerpoint/2010/main" val="862237172"/>
       </p:ext>
     </p:extLst>
   </p:cSld>
   <p:clrMapOvr>
     <a:masterClrMapping/>
   </p:clrMapOvr>
-  <p:timing>
-    <p:tnLst>
-      <p:par>
-        <p:cTn id="1" dur="indefinite" restart="never" nodeType="tmRoot"/>
-      </p:par>
-    </p:tnLst>
-  </p:timing>
 </p:sld>
 </file>
 
@@ -3834,6 +3875,11 @@
     </a:txDef>
   </a:objectDefaults>
   <a:extraClrSchemeLst/>
+  <a:extLst>
+    <a:ext uri="{05A4C25C-085E-4340-85A3-A5531E510DB2}">
+      <thm15:themeFamily xmlns:thm15="http://schemas.microsoft.com/office/thememl/2012/main" name="発表用16-9.potx" id="{DFD96B28-CC1C-5841-A781-223372B0F699}" vid="{DAD65DD3-42BE-204F-817B-0A69EC3C8856}"/>
+    </a:ext>
+  </a:extLst>
 </a:theme>
 </file>
 

</xml_diff>

<commit_message>
:sparkles: Enhance dotfiles with new scripts and configuration updates
- Add utility scripts: crosswords hint, PDF processing, data tools
- Improve shell configurations (.zshrc, .vimrc) with Claude Code optimizations
- Update Brewfile with latest packages and corrected cask names
- Refactor maintenance scripts with modular anti-virus handling
- Add new cheat sheets for hdiutil and pandoc
- Configure Claude Code settings and remove old git-commit command
</commit_message>
<xml_diff>
--- a/template/template.pptx
+++ b/template/template.pptx
@@ -5,15 +5,16 @@
     <p:sldMasterId id="2147483648" r:id="rId1"/>
   </p:sldMasterIdLst>
   <p:notesMasterIdLst>
-    <p:notesMasterId r:id="rId5"/>
+    <p:notesMasterId r:id="rId6"/>
   </p:notesMasterIdLst>
   <p:handoutMasterIdLst>
-    <p:handoutMasterId r:id="rId6"/>
+    <p:handoutMasterId r:id="rId7"/>
   </p:handoutMasterIdLst>
   <p:sldIdLst>
     <p:sldId id="256" r:id="rId2"/>
     <p:sldId id="259" r:id="rId3"/>
     <p:sldId id="261" r:id="rId4"/>
+    <p:sldId id="262" r:id="rId5"/>
   </p:sldIdLst>
   <p:sldSz cx="12192000" cy="6858000"/>
   <p:notesSz cx="6858000" cy="9144000"/>
@@ -234,7 +235,7 @@
                 <a:ea typeface="ヒラギノ丸ゴ Pro W4"/>
               </a:rPr>
               <a:pPr/>
-              <a:t>2024/7/17</a:t>
+              <a:t>2025/8/25</a:t>
             </a:fld>
             <a:endParaRPr kumimoji="1" lang="ja-JP" altLang="en-US" dirty="0">
               <a:latin typeface="Myriad Pro"/>
@@ -654,7 +655,7 @@
             <a:fld id="{CC64A06D-9B71-4CE4-BE9A-4B4486566249}" type="datetimeFigureOut">
               <a:rPr lang="ja-JP" altLang="en-US" smtClean="0"/>
               <a:pPr/>
-              <a:t>2024/7/17</a:t>
+              <a:t>2025/8/25</a:t>
             </a:fld>
             <a:endParaRPr lang="ja-JP" altLang="en-US" dirty="0"/>
           </a:p>
@@ -1286,7 +1287,7 @@
                 </a:solidFill>
                 <a:ea typeface="ヒラギノ丸ゴ Pro W4"/>
               </a:rPr>
-              <a:t>2024/07/17</a:t>
+              <a:t>2025/08/25</a:t>
             </a:fld>
             <a:endParaRPr kumimoji="1" lang="ja-JP" altLang="en-US" sz="1200" dirty="0">
               <a:solidFill>
@@ -3570,6 +3571,376 @@
     <p:extLst>
       <p:ext uri="{BB962C8B-B14F-4D97-AF65-F5344CB8AC3E}">
         <p14:creationId xmlns:p14="http://schemas.microsoft.com/office/powerpoint/2010/main" val="862237172"/>
+      </p:ext>
+    </p:extLst>
+  </p:cSld>
+  <p:clrMapOvr>
+    <a:masterClrMapping/>
+  </p:clrMapOvr>
+</p:sld>
+</file>
+
+<file path=ppt/slides/slide4.xml><?xml version="1.0" encoding="utf-8"?>
+<p:sld xmlns:a="http://schemas.openxmlformats.org/drawingml/2006/main" xmlns:r="http://schemas.openxmlformats.org/officeDocument/2006/relationships" xmlns:p="http://schemas.openxmlformats.org/presentationml/2006/main">
+  <p:cSld>
+    <p:spTree>
+      <p:nvGrpSpPr>
+        <p:cNvPr id="1" name=""/>
+        <p:cNvGrpSpPr/>
+        <p:nvPr/>
+      </p:nvGrpSpPr>
+      <p:grpSpPr>
+        <a:xfrm>
+          <a:off x="0" y="0"/>
+          <a:ext cx="0" cy="0"/>
+          <a:chOff x="0" y="0"/>
+          <a:chExt cx="0" cy="0"/>
+        </a:xfrm>
+      </p:grpSpPr>
+      <p:sp>
+        <p:nvSpPr>
+          <p:cNvPr id="2" name="タイトル 1">
+            <a:extLst>
+              <a:ext uri="{FF2B5EF4-FFF2-40B4-BE49-F238E27FC236}">
+                <a16:creationId xmlns:a16="http://schemas.microsoft.com/office/drawing/2014/main" id="{96E341A5-9120-D5A4-DF15-63DB0066EC39}"/>
+              </a:ext>
+            </a:extLst>
+          </p:cNvPr>
+          <p:cNvSpPr>
+            <a:spLocks noGrp="1"/>
+          </p:cNvSpPr>
+          <p:nvPr>
+            <p:ph type="title"/>
+          </p:nvPr>
+        </p:nvSpPr>
+        <p:spPr/>
+        <p:txBody>
+          <a:bodyPr/>
+          <a:lstStyle/>
+          <a:p>
+            <a:r>
+              <a:rPr kumimoji="1" lang="ja-JP" altLang="en-US"/>
+              <a:t>部品</a:t>
+            </a:r>
+          </a:p>
+        </p:txBody>
+      </p:sp>
+      <p:sp>
+        <p:nvSpPr>
+          <p:cNvPr id="6" name="メモ 5">
+            <a:extLst>
+              <a:ext uri="{FF2B5EF4-FFF2-40B4-BE49-F238E27FC236}">
+                <a16:creationId xmlns:a16="http://schemas.microsoft.com/office/drawing/2014/main" id="{BBBC0E0F-5EF8-9EF5-7892-24E262E2E788}"/>
+              </a:ext>
+            </a:extLst>
+          </p:cNvPr>
+          <p:cNvSpPr/>
+          <p:nvPr/>
+        </p:nvSpPr>
+        <p:spPr>
+          <a:xfrm>
+            <a:off x="1298067" y="4442695"/>
+            <a:ext cx="2192216" cy="1655762"/>
+          </a:xfrm>
+          <a:custGeom>
+            <a:avLst/>
+            <a:gdLst>
+              <a:gd name="connsiteX0" fmla="*/ 0 w 2192216"/>
+              <a:gd name="connsiteY0" fmla="*/ 0 h 1655762"/>
+              <a:gd name="connsiteX1" fmla="*/ 2192216 w 2192216"/>
+              <a:gd name="connsiteY1" fmla="*/ 0 h 1655762"/>
+              <a:gd name="connsiteX2" fmla="*/ 2192216 w 2192216"/>
+              <a:gd name="connsiteY2" fmla="*/ 1286328 h 1655762"/>
+              <a:gd name="connsiteX3" fmla="*/ 1822782 w 2192216"/>
+              <a:gd name="connsiteY3" fmla="*/ 1655762 h 1655762"/>
+              <a:gd name="connsiteX4" fmla="*/ 0 w 2192216"/>
+              <a:gd name="connsiteY4" fmla="*/ 1655762 h 1655762"/>
+              <a:gd name="connsiteX5" fmla="*/ 0 w 2192216"/>
+              <a:gd name="connsiteY5" fmla="*/ 0 h 1655762"/>
+              <a:gd name="connsiteX0" fmla="*/ 1822782 w 2192216"/>
+              <a:gd name="connsiteY0" fmla="*/ 1655762 h 1655762"/>
+              <a:gd name="connsiteX1" fmla="*/ 1896669 w 2192216"/>
+              <a:gd name="connsiteY1" fmla="*/ 1360215 h 1655762"/>
+              <a:gd name="connsiteX2" fmla="*/ 2192216 w 2192216"/>
+              <a:gd name="connsiteY2" fmla="*/ 1286328 h 1655762"/>
+              <a:gd name="connsiteX3" fmla="*/ 1822782 w 2192216"/>
+              <a:gd name="connsiteY3" fmla="*/ 1655762 h 1655762"/>
+              <a:gd name="connsiteX0" fmla="*/ 1822782 w 2192216"/>
+              <a:gd name="connsiteY0" fmla="*/ 1655762 h 1655762"/>
+              <a:gd name="connsiteX1" fmla="*/ 1896669 w 2192216"/>
+              <a:gd name="connsiteY1" fmla="*/ 1360215 h 1655762"/>
+              <a:gd name="connsiteX2" fmla="*/ 2192216 w 2192216"/>
+              <a:gd name="connsiteY2" fmla="*/ 1286328 h 1655762"/>
+              <a:gd name="connsiteX3" fmla="*/ 1822782 w 2192216"/>
+              <a:gd name="connsiteY3" fmla="*/ 1655762 h 1655762"/>
+              <a:gd name="connsiteX4" fmla="*/ 0 w 2192216"/>
+              <a:gd name="connsiteY4" fmla="*/ 1655762 h 1655762"/>
+              <a:gd name="connsiteX5" fmla="*/ 0 w 2192216"/>
+              <a:gd name="connsiteY5" fmla="*/ 0 h 1655762"/>
+              <a:gd name="connsiteX6" fmla="*/ 2192216 w 2192216"/>
+              <a:gd name="connsiteY6" fmla="*/ 0 h 1655762"/>
+              <a:gd name="connsiteX7" fmla="*/ 2192216 w 2192216"/>
+              <a:gd name="connsiteY7" fmla="*/ 1286328 h 1655762"/>
+            </a:gdLst>
+            <a:ahLst/>
+            <a:cxnLst>
+              <a:cxn ang="0">
+                <a:pos x="connsiteX0" y="connsiteY0"/>
+              </a:cxn>
+              <a:cxn ang="0">
+                <a:pos x="connsiteX1" y="connsiteY1"/>
+              </a:cxn>
+              <a:cxn ang="0">
+                <a:pos x="connsiteX2" y="connsiteY2"/>
+              </a:cxn>
+              <a:cxn ang="0">
+                <a:pos x="connsiteX3" y="connsiteY3"/>
+              </a:cxn>
+              <a:cxn ang="0">
+                <a:pos x="connsiteX4" y="connsiteY4"/>
+              </a:cxn>
+              <a:cxn ang="0">
+                <a:pos x="connsiteX5" y="connsiteY5"/>
+              </a:cxn>
+              <a:cxn ang="0">
+                <a:pos x="connsiteX6" y="connsiteY6"/>
+              </a:cxn>
+              <a:cxn ang="0">
+                <a:pos x="connsiteX7" y="connsiteY7"/>
+              </a:cxn>
+            </a:cxnLst>
+            <a:rect l="l" t="t" r="r" b="b"/>
+            <a:pathLst>
+              <a:path w="2192216" h="1655762" stroke="0" extrusionOk="0">
+                <a:moveTo>
+                  <a:pt x="0" y="0"/>
+                </a:moveTo>
+                <a:cubicBezTo>
+                  <a:pt x="529914" y="118645"/>
+                  <a:pt x="1533139" y="116012"/>
+                  <a:pt x="2192216" y="0"/>
+                </a:cubicBezTo>
+                <a:cubicBezTo>
+                  <a:pt x="2168478" y="181747"/>
+                  <a:pt x="2289428" y="1116423"/>
+                  <a:pt x="2192216" y="1286328"/>
+                </a:cubicBezTo>
+                <a:cubicBezTo>
+                  <a:pt x="2105496" y="1327870"/>
+                  <a:pt x="1987543" y="1462922"/>
+                  <a:pt x="1822782" y="1655762"/>
+                </a:cubicBezTo>
+                <a:cubicBezTo>
+                  <a:pt x="1582575" y="1629224"/>
+                  <a:pt x="331516" y="1491858"/>
+                  <a:pt x="0" y="1655762"/>
+                </a:cubicBezTo>
+                <a:cubicBezTo>
+                  <a:pt x="-7263" y="1158699"/>
+                  <a:pt x="85187" y="192181"/>
+                  <a:pt x="0" y="0"/>
+                </a:cubicBezTo>
+                <a:close/>
+              </a:path>
+              <a:path w="2192216" h="1655762" fill="darkenLess" stroke="0" extrusionOk="0">
+                <a:moveTo>
+                  <a:pt x="1822782" y="1655762"/>
+                </a:moveTo>
+                <a:cubicBezTo>
+                  <a:pt x="1860171" y="1591556"/>
+                  <a:pt x="1889039" y="1448121"/>
+                  <a:pt x="1896669" y="1360215"/>
+                </a:cubicBezTo>
+                <a:cubicBezTo>
+                  <a:pt x="2004452" y="1351157"/>
+                  <a:pt x="2055018" y="1329909"/>
+                  <a:pt x="2192216" y="1286328"/>
+                </a:cubicBezTo>
+                <a:cubicBezTo>
+                  <a:pt x="2081342" y="1431132"/>
+                  <a:pt x="1941608" y="1559382"/>
+                  <a:pt x="1822782" y="1655762"/>
+                </a:cubicBezTo>
+                <a:close/>
+              </a:path>
+              <a:path w="2192216" h="1655762" fill="none" extrusionOk="0">
+                <a:moveTo>
+                  <a:pt x="1822782" y="1655762"/>
+                </a:moveTo>
+                <a:cubicBezTo>
+                  <a:pt x="1848220" y="1579378"/>
+                  <a:pt x="1878212" y="1416068"/>
+                  <a:pt x="1896669" y="1360215"/>
+                </a:cubicBezTo>
+                <a:cubicBezTo>
+                  <a:pt x="2015282" y="1333089"/>
+                  <a:pt x="2049069" y="1326609"/>
+                  <a:pt x="2192216" y="1286328"/>
+                </a:cubicBezTo>
+                <a:cubicBezTo>
+                  <a:pt x="2133149" y="1406912"/>
+                  <a:pt x="1975583" y="1514677"/>
+                  <a:pt x="1822782" y="1655762"/>
+                </a:cubicBezTo>
+                <a:cubicBezTo>
+                  <a:pt x="1221682" y="1767534"/>
+                  <a:pt x="245997" y="1817353"/>
+                  <a:pt x="0" y="1655762"/>
+                </a:cubicBezTo>
+                <a:cubicBezTo>
+                  <a:pt x="-68426" y="1378452"/>
+                  <a:pt x="38623" y="752982"/>
+                  <a:pt x="0" y="0"/>
+                </a:cubicBezTo>
+                <a:cubicBezTo>
+                  <a:pt x="690293" y="-119236"/>
+                  <a:pt x="1600849" y="89530"/>
+                  <a:pt x="2192216" y="0"/>
+                </a:cubicBezTo>
+                <a:cubicBezTo>
+                  <a:pt x="2182333" y="307092"/>
+                  <a:pt x="2169974" y="845135"/>
+                  <a:pt x="2192216" y="1286328"/>
+                </a:cubicBezTo>
+              </a:path>
+              <a:path w="2192216" h="1655762" fill="none" stroke="0" extrusionOk="0">
+                <a:moveTo>
+                  <a:pt x="1822782" y="1655762"/>
+                </a:moveTo>
+                <a:cubicBezTo>
+                  <a:pt x="1848061" y="1552076"/>
+                  <a:pt x="1861854" y="1458293"/>
+                  <a:pt x="1896669" y="1360215"/>
+                </a:cubicBezTo>
+                <a:cubicBezTo>
+                  <a:pt x="1941401" y="1346027"/>
+                  <a:pt x="2123335" y="1325117"/>
+                  <a:pt x="2192216" y="1286328"/>
+                </a:cubicBezTo>
+                <a:cubicBezTo>
+                  <a:pt x="1984672" y="1434069"/>
+                  <a:pt x="1951122" y="1486142"/>
+                  <a:pt x="1822782" y="1655762"/>
+                </a:cubicBezTo>
+                <a:cubicBezTo>
+                  <a:pt x="1541900" y="1569724"/>
+                  <a:pt x="772120" y="1789734"/>
+                  <a:pt x="0" y="1655762"/>
+                </a:cubicBezTo>
+                <a:cubicBezTo>
+                  <a:pt x="126363" y="1389888"/>
+                  <a:pt x="-75527" y="374707"/>
+                  <a:pt x="0" y="0"/>
+                </a:cubicBezTo>
+                <a:cubicBezTo>
+                  <a:pt x="370117" y="-155197"/>
+                  <a:pt x="1362321" y="-163020"/>
+                  <a:pt x="2192216" y="0"/>
+                </a:cubicBezTo>
+                <a:cubicBezTo>
+                  <a:pt x="2179905" y="506223"/>
+                  <a:pt x="2298989" y="874661"/>
+                  <a:pt x="2192216" y="1286328"/>
+                </a:cubicBezTo>
+              </a:path>
+            </a:pathLst>
+          </a:custGeom>
+          <a:solidFill>
+            <a:srgbClr val="FFC000">
+              <a:lumMod val="20000"/>
+              <a:lumOff val="80000"/>
+            </a:srgbClr>
+          </a:solidFill>
+          <a:ln w="28575" cap="flat" cmpd="sng" algn="ctr">
+            <a:solidFill>
+              <a:srgbClr val="FFFFFF">
+                <a:alpha val="0"/>
+              </a:srgbClr>
+            </a:solidFill>
+            <a:prstDash val="solid"/>
+            <a:miter lim="800000"/>
+            <a:extLst>
+              <a:ext uri="{C807C97D-BFC1-408E-A445-0C87EB9F89A2}">
+                <ask:lineSketchStyleProps xmlns:ask="http://schemas.microsoft.com/office/drawing/2018/sketchyshapes" sd="1219033472">
+                  <a:prstGeom prst="foldedCorner">
+                    <a:avLst>
+                      <a:gd name="adj" fmla="val 22312"/>
+                    </a:avLst>
+                  </a:prstGeom>
+                  <ask:type>
+                    <ask:lineSketchCurved/>
+                  </ask:type>
+                </ask:lineSketchStyleProps>
+              </a:ext>
+            </a:extLst>
+          </a:ln>
+          <a:effectLst>
+            <a:outerShdw blurRad="355600" dist="332289" dir="3780000" algn="tl" rotWithShape="0">
+              <a:prstClr val="black">
+                <a:alpha val="40000"/>
+              </a:prstClr>
+            </a:outerShdw>
+          </a:effectLst>
+        </p:spPr>
+        <p:txBody>
+          <a:bodyPr rtlCol="0" anchor="ctr"/>
+          <a:lstStyle/>
+          <a:p>
+            <a:pPr marL="0" marR="0" lvl="0" indent="0" algn="ctr" defTabSz="914400" eaLnBrk="1" fontAlgn="auto" latinLnBrk="0" hangingPunct="1">
+              <a:lnSpc>
+                <a:spcPct val="100000"/>
+              </a:lnSpc>
+              <a:spcBef>
+                <a:spcPts val="0"/>
+              </a:spcBef>
+              <a:spcAft>
+                <a:spcPts val="0"/>
+              </a:spcAft>
+              <a:buClrTx/>
+              <a:buSzTx/>
+              <a:buFontTx/>
+              <a:buNone/>
+              <a:tabLst/>
+              <a:defRPr/>
+            </a:pPr>
+            <a:r>
+              <a:rPr kumimoji="0" lang="en-US" altLang="ja-JP" sz="1800" b="1" i="0" u="none" strike="noStrike" kern="0" cap="none" spc="0" normalizeH="0" baseline="0" noProof="0" dirty="0">
+                <a:ln>
+                  <a:noFill/>
+                </a:ln>
+                <a:solidFill>
+                  <a:sysClr val="windowText" lastClr="000000"/>
+                </a:solidFill>
+                <a:effectLst/>
+                <a:uLnTx/>
+                <a:uFillTx/>
+                <a:latin typeface="游ゴシック" panose="020F0502020204030204"/>
+                <a:ea typeface="游ゴシック" panose="020B0400000000000000" pitchFamily="34" charset="-128"/>
+                <a:cs typeface="+mn-cs"/>
+              </a:rPr>
+              <a:t>memo</a:t>
+            </a:r>
+            <a:endParaRPr kumimoji="0" lang="ja-JP" altLang="en-US" sz="1800" b="1" i="0" u="none" strike="noStrike" kern="0" cap="none" spc="0" normalizeH="0" baseline="0" noProof="0">
+              <a:ln>
+                <a:noFill/>
+              </a:ln>
+              <a:solidFill>
+                <a:sysClr val="windowText" lastClr="000000"/>
+              </a:solidFill>
+              <a:effectLst/>
+              <a:uLnTx/>
+              <a:uFillTx/>
+              <a:latin typeface="游ゴシック" panose="020F0502020204030204"/>
+              <a:ea typeface="游ゴシック" panose="020B0400000000000000" pitchFamily="34" charset="-128"/>
+              <a:cs typeface="+mn-cs"/>
+            </a:endParaRPr>
+          </a:p>
+        </p:txBody>
+      </p:sp>
+    </p:spTree>
+    <p:extLst>
+      <p:ext uri="{BB962C8B-B14F-4D97-AF65-F5344CB8AC3E}">
+        <p14:creationId xmlns:p14="http://schemas.microsoft.com/office/powerpoint/2010/main" val="4176350348"/>
       </p:ext>
     </p:extLst>
   </p:cSld>

</xml_diff>